<commit_message>
cleaned up code a little
</commit_message>
<xml_diff>
--- a/How-To Guide for Dataplotter.pptx
+++ b/How-To Guide for Dataplotter.pptx
@@ -5,28 +5,27 @@
     <p:sldMasterId id="2147483680" r:id="rId4"/>
   </p:sldMasterIdLst>
   <p:notesMasterIdLst>
-    <p:notesMasterId r:id="rId21"/>
+    <p:notesMasterId r:id="rId20"/>
   </p:notesMasterIdLst>
   <p:handoutMasterIdLst>
-    <p:handoutMasterId r:id="rId22"/>
+    <p:handoutMasterId r:id="rId21"/>
   </p:handoutMasterIdLst>
   <p:sldIdLst>
     <p:sldId id="273" r:id="rId5"/>
-    <p:sldId id="274" r:id="rId6"/>
-    <p:sldId id="275" r:id="rId7"/>
-    <p:sldId id="276" r:id="rId8"/>
-    <p:sldId id="278" r:id="rId9"/>
-    <p:sldId id="279" r:id="rId10"/>
-    <p:sldId id="283" r:id="rId11"/>
-    <p:sldId id="280" r:id="rId12"/>
-    <p:sldId id="281" r:id="rId13"/>
-    <p:sldId id="282" r:id="rId14"/>
-    <p:sldId id="284" r:id="rId15"/>
-    <p:sldId id="287" r:id="rId16"/>
-    <p:sldId id="285" r:id="rId17"/>
-    <p:sldId id="286" r:id="rId18"/>
-    <p:sldId id="288" r:id="rId19"/>
-    <p:sldId id="277" r:id="rId20"/>
+    <p:sldId id="275" r:id="rId6"/>
+    <p:sldId id="276" r:id="rId7"/>
+    <p:sldId id="278" r:id="rId8"/>
+    <p:sldId id="279" r:id="rId9"/>
+    <p:sldId id="283" r:id="rId10"/>
+    <p:sldId id="280" r:id="rId11"/>
+    <p:sldId id="281" r:id="rId12"/>
+    <p:sldId id="282" r:id="rId13"/>
+    <p:sldId id="284" r:id="rId14"/>
+    <p:sldId id="287" r:id="rId15"/>
+    <p:sldId id="285" r:id="rId16"/>
+    <p:sldId id="286" r:id="rId17"/>
+    <p:sldId id="288" r:id="rId18"/>
+    <p:sldId id="277" r:id="rId19"/>
   </p:sldIdLst>
   <p:sldSz cx="9144000" cy="5143500" type="screen16x9"/>
   <p:notesSz cx="6858000" cy="9144000"/>
@@ -248,7 +247,7 @@
           <a:p>
             <a:fld id="{4F183950-8760-9D47-977D-3190FADE7CF2}" type="datetimeFigureOut">
               <a:rPr lang="en-US" smtClean="0"/>
-              <a:t>1/24/2022</a:t>
+              <a:t>4/20/2022</a:t>
             </a:fld>
             <a:endParaRPr lang="en-US"/>
           </a:p>
@@ -414,7 +413,7 @@
           <a:p>
             <a:fld id="{C7ACFDD2-B013-8649-A816-C00B94E6CE1F}" type="datetimeFigureOut">
               <a:rPr lang="en-US" smtClean="0"/>
-              <a:t>1/24/2022</a:t>
+              <a:t>4/20/2022</a:t>
             </a:fld>
             <a:endParaRPr lang="en-US"/>
           </a:p>
@@ -2159,7 +2158,7 @@
           <p:cNvPr id="2" name="Picture 1">
             <a:extLst>
               <a:ext uri="{FF2B5EF4-FFF2-40B4-BE49-F238E27FC236}">
-                <a16:creationId xmlns:a16="http://schemas.microsoft.com/office/drawing/2014/main" id="{047C53D1-816E-44D1-9CD0-FC99F3742548}"/>
+                <a16:creationId xmlns:a16="http://schemas.microsoft.com/office/drawing/2014/main" id="{0B9AB0F5-410C-4B8F-9494-6A1A5E21598D}"/>
               </a:ext>
             </a:extLst>
           </p:cNvPr>
@@ -2170,13 +2169,13 @@
         </p:nvPicPr>
         <p:blipFill rotWithShape="1">
           <a:blip r:embed="rId2"/>
-          <a:srcRect l="2561" t="4514" r="3474" b="5609"/>
+          <a:srcRect l="3313" t="3809" r="4501" b="6173"/>
           <a:stretch/>
         </p:blipFill>
         <p:spPr>
           <a:xfrm>
-            <a:off x="3846285" y="333828"/>
-            <a:ext cx="5142797" cy="3868058"/>
+            <a:off x="3556000" y="181428"/>
+            <a:ext cx="5413828" cy="4158344"/>
           </a:xfrm>
           <a:prstGeom prst="rect">
             <a:avLst/>
@@ -2185,10 +2184,10 @@
       </p:pic>
       <p:sp>
         <p:nvSpPr>
-          <p:cNvPr id="5" name="TextBox 4">
+          <p:cNvPr id="8" name="TextBox 7">
             <a:extLst>
               <a:ext uri="{FF2B5EF4-FFF2-40B4-BE49-F238E27FC236}">
-                <a16:creationId xmlns:a16="http://schemas.microsoft.com/office/drawing/2014/main" id="{EFD97C2D-C2D6-4FDB-86A6-53DE98A8F1C9}"/>
+                <a16:creationId xmlns:a16="http://schemas.microsoft.com/office/drawing/2014/main" id="{88295796-913B-40C7-B761-F850BCF22A3F}"/>
               </a:ext>
             </a:extLst>
           </p:cNvPr>
@@ -2197,8 +2196,8 @@
         </p:nvSpPr>
         <p:spPr>
           <a:xfrm>
-            <a:off x="210603" y="312057"/>
-            <a:ext cx="3635683" cy="3170099"/>
+            <a:off x="0" y="1019739"/>
+            <a:ext cx="3635683" cy="3477875"/>
           </a:xfrm>
           <a:prstGeom prst="rect">
             <a:avLst/>
@@ -2223,7 +2222,7 @@
                   </a:schemeClr>
                 </a:solidFill>
               </a:rPr>
-              <a:t>The list of channels will be filtered according to what has been typed</a:t>
+              <a:t>To select a channel, simply double click on it</a:t>
             </a:r>
           </a:p>
           <a:p>
@@ -2252,17 +2251,46 @@
                   </a:schemeClr>
                 </a:solidFill>
               </a:rPr>
-              <a:t>For example, “riso” has been typed in and the channels are automatically filtered to the channels that include “riso”</a:t>
+              <a:t>Once it is selected, it will populate in the box titled “Channels you chose”</a:t>
+            </a:r>
+          </a:p>
+          <a:p>
+            <a:pPr marL="457200" indent="-457200">
+              <a:buFont typeface="Arial" panose="020B0604020202020204" pitchFamily="34" charset="0"/>
+              <a:buChar char="•"/>
+            </a:pPr>
+            <a:endParaRPr lang="en-US" sz="2000" dirty="0">
+              <a:solidFill>
+                <a:schemeClr val="bg2">
+                  <a:lumMod val="10000"/>
+                </a:schemeClr>
+              </a:solidFill>
+            </a:endParaRPr>
+          </a:p>
+          <a:p>
+            <a:pPr marL="457200" indent="-457200">
+              <a:buFont typeface="Arial" panose="020B0604020202020204" pitchFamily="34" charset="0"/>
+              <a:buChar char="•"/>
+            </a:pPr>
+            <a:r>
+              <a:rPr lang="en-US" sz="2000" dirty="0">
+                <a:solidFill>
+                  <a:schemeClr val="bg2">
+                    <a:lumMod val="10000"/>
+                  </a:schemeClr>
+                </a:solidFill>
+              </a:rPr>
+              <a:t>Any number of channels can be selected. There is no maximum number of channels</a:t>
             </a:r>
           </a:p>
         </p:txBody>
       </p:sp>
       <p:cxnSp>
         <p:nvCxnSpPr>
-          <p:cNvPr id="6" name="Straight Arrow Connector 5">
+          <p:cNvPr id="9" name="Straight Arrow Connector 8">
             <a:extLst>
               <a:ext uri="{FF2B5EF4-FFF2-40B4-BE49-F238E27FC236}">
-                <a16:creationId xmlns:a16="http://schemas.microsoft.com/office/drawing/2014/main" id="{1BCB1112-A749-42E2-8214-4BC608FB3EB9}"/>
+                <a16:creationId xmlns:a16="http://schemas.microsoft.com/office/drawing/2014/main" id="{DBBC2E23-33C2-4580-9932-262FD2721F28}"/>
               </a:ext>
             </a:extLst>
           </p:cNvPr>
@@ -2273,8 +2301,8 @@
         </p:nvCxnSpPr>
         <p:spPr>
           <a:xfrm>
-            <a:off x="2293258" y="2188754"/>
-            <a:ext cx="2561771" cy="404767"/>
+            <a:off x="3287488" y="1526177"/>
+            <a:ext cx="1284512" cy="1129937"/>
           </a:xfrm>
           <a:prstGeom prst="straightConnector1">
             <a:avLst/>
@@ -2304,12 +2332,59 @@
           </a:fontRef>
         </p:style>
       </p:cxnSp>
+      <p:cxnSp>
+        <p:nvCxnSpPr>
+          <p:cNvPr id="12" name="Straight Arrow Connector 11">
+            <a:extLst>
+              <a:ext uri="{FF2B5EF4-FFF2-40B4-BE49-F238E27FC236}">
+                <a16:creationId xmlns:a16="http://schemas.microsoft.com/office/drawing/2014/main" id="{A4368FF3-3DA3-49BC-B488-3AB1FF7FC66E}"/>
+              </a:ext>
+            </a:extLst>
+          </p:cNvPr>
+          <p:cNvCxnSpPr>
+            <a:cxnSpLocks/>
+          </p:cNvCxnSpPr>
+          <p:nvPr/>
+        </p:nvCxnSpPr>
+        <p:spPr>
+          <a:xfrm>
+            <a:off x="3022456" y="2808514"/>
+            <a:ext cx="4270973" cy="354038"/>
+          </a:xfrm>
+          <a:prstGeom prst="straightConnector1">
+            <a:avLst/>
+          </a:prstGeom>
+          <a:ln>
+            <a:solidFill>
+              <a:schemeClr val="bg2">
+                <a:lumMod val="10000"/>
+              </a:schemeClr>
+            </a:solidFill>
+            <a:tailEnd type="triangle"/>
+          </a:ln>
+          <a:effectLst/>
+        </p:spPr>
+        <p:style>
+          <a:lnRef idx="2">
+            <a:schemeClr val="accent1"/>
+          </a:lnRef>
+          <a:fillRef idx="0">
+            <a:schemeClr val="accent1"/>
+          </a:fillRef>
+          <a:effectRef idx="1">
+            <a:schemeClr val="accent1"/>
+          </a:effectRef>
+          <a:fontRef idx="minor">
+            <a:schemeClr val="tx1"/>
+          </a:fontRef>
+        </p:style>
+      </p:cxnSp>
       <p:sp>
         <p:nvSpPr>
-          <p:cNvPr id="9" name="Rectangle 8">
+          <p:cNvPr id="14" name="Rectangle 13">
             <a:extLst>
               <a:ext uri="{FF2B5EF4-FFF2-40B4-BE49-F238E27FC236}">
-                <a16:creationId xmlns:a16="http://schemas.microsoft.com/office/drawing/2014/main" id="{A2DDDBE2-93B3-44E0-B66F-EEADE268A085}"/>
+                <a16:creationId xmlns:a16="http://schemas.microsoft.com/office/drawing/2014/main" id="{A0BDA6E4-4ED6-4472-9D97-D99CAE05C084}"/>
               </a:ext>
             </a:extLst>
           </p:cNvPr>
@@ -2318,8 +2393,8 @@
         </p:nvSpPr>
         <p:spPr>
           <a:xfrm>
-            <a:off x="4913087" y="2213439"/>
-            <a:ext cx="1553027" cy="1690904"/>
+            <a:off x="4630057" y="2311400"/>
+            <a:ext cx="1785111" cy="1738086"/>
           </a:xfrm>
           <a:prstGeom prst="rect">
             <a:avLst/>
@@ -2355,10 +2430,61 @@
           </a:p>
         </p:txBody>
       </p:sp>
+      <p:sp>
+        <p:nvSpPr>
+          <p:cNvPr id="15" name="Rectangle 14">
+            <a:extLst>
+              <a:ext uri="{FF2B5EF4-FFF2-40B4-BE49-F238E27FC236}">
+                <a16:creationId xmlns:a16="http://schemas.microsoft.com/office/drawing/2014/main" id="{DE88E90F-2E16-461F-A882-DC9739EC34ED}"/>
+              </a:ext>
+            </a:extLst>
+          </p:cNvPr>
+          <p:cNvSpPr/>
+          <p:nvPr/>
+        </p:nvSpPr>
+        <p:spPr>
+          <a:xfrm>
+            <a:off x="7351486" y="2260600"/>
+            <a:ext cx="1690914" cy="1788886"/>
+          </a:xfrm>
+          <a:prstGeom prst="rect">
+            <a:avLst/>
+          </a:prstGeom>
+          <a:noFill/>
+          <a:ln w="19050">
+            <a:solidFill>
+              <a:srgbClr val="FF0000"/>
+            </a:solidFill>
+          </a:ln>
+          <a:effectLst/>
+        </p:spPr>
+        <p:style>
+          <a:lnRef idx="1">
+            <a:schemeClr val="accent1"/>
+          </a:lnRef>
+          <a:fillRef idx="3">
+            <a:schemeClr val="accent1"/>
+          </a:fillRef>
+          <a:effectRef idx="2">
+            <a:schemeClr val="accent1"/>
+          </a:effectRef>
+          <a:fontRef idx="minor">
+            <a:schemeClr val="lt1"/>
+          </a:fontRef>
+        </p:style>
+        <p:txBody>
+          <a:bodyPr rtlCol="0" anchor="ctr"/>
+          <a:lstStyle/>
+          <a:p>
+            <a:pPr algn="ctr"/>
+            <a:endParaRPr lang="en-US"/>
+          </a:p>
+        </p:txBody>
+      </p:sp>
     </p:spTree>
     <p:extLst>
       <p:ext uri="{BB962C8B-B14F-4D97-AF65-F5344CB8AC3E}">
-        <p14:creationId xmlns:p14="http://schemas.microsoft.com/office/powerpoint/2010/main" val="3461942798"/>
+        <p14:creationId xmlns:p14="http://schemas.microsoft.com/office/powerpoint/2010/main" val="2836014920"/>
       </p:ext>
     </p:extLst>
   </p:cSld>
@@ -2438,35 +2564,6 @@
           </a:p>
         </p:txBody>
       </p:sp>
-      <p:pic>
-        <p:nvPicPr>
-          <p:cNvPr id="2" name="Picture 1">
-            <a:extLst>
-              <a:ext uri="{FF2B5EF4-FFF2-40B4-BE49-F238E27FC236}">
-                <a16:creationId xmlns:a16="http://schemas.microsoft.com/office/drawing/2014/main" id="{0B9AB0F5-410C-4B8F-9494-6A1A5E21598D}"/>
-              </a:ext>
-            </a:extLst>
-          </p:cNvPr>
-          <p:cNvPicPr>
-            <a:picLocks noChangeAspect="1"/>
-          </p:cNvPicPr>
-          <p:nvPr/>
-        </p:nvPicPr>
-        <p:blipFill rotWithShape="1">
-          <a:blip r:embed="rId2"/>
-          <a:srcRect l="3313" t="3809" r="4501" b="6173"/>
-          <a:stretch/>
-        </p:blipFill>
-        <p:spPr>
-          <a:xfrm>
-            <a:off x="3556000" y="181428"/>
-            <a:ext cx="5413828" cy="4158344"/>
-          </a:xfrm>
-          <a:prstGeom prst="rect">
-            <a:avLst/>
-          </a:prstGeom>
-        </p:spPr>
-      </p:pic>
       <p:sp>
         <p:nvSpPr>
           <p:cNvPr id="8" name="TextBox 7">
@@ -2481,7 +2578,7 @@
         </p:nvSpPr>
         <p:spPr>
           <a:xfrm>
-            <a:off x="0" y="1019739"/>
+            <a:off x="87231" y="328865"/>
             <a:ext cx="3635683" cy="3477875"/>
           </a:xfrm>
           <a:prstGeom prst="rect">
@@ -2507,7 +2604,7 @@
                   </a:schemeClr>
                 </a:solidFill>
               </a:rPr>
-              <a:t>To select a channel, simply double click on it</a:t>
+              <a:t>To select a different channel, simply delete what was previously typed in the search box and begin typing the name of the new channel </a:t>
             </a:r>
           </a:p>
           <a:p>
@@ -2536,7 +2633,7 @@
                   </a:schemeClr>
                 </a:solidFill>
               </a:rPr>
-              <a:t>Once it is selected, it will populate in the box titled “Channels you chose”</a:t>
+              <a:t>Select the new channel by double clicking it (same as before)</a:t>
             </a:r>
           </a:p>
           <a:p>
@@ -2552,30 +2649,43 @@
               </a:solidFill>
             </a:endParaRPr>
           </a:p>
-          <a:p>
-            <a:pPr marL="457200" indent="-457200">
-              <a:buFont typeface="Arial" panose="020B0604020202020204" pitchFamily="34" charset="0"/>
-              <a:buChar char="•"/>
-            </a:pPr>
-            <a:r>
-              <a:rPr lang="en-US" sz="2000" dirty="0">
-                <a:solidFill>
-                  <a:schemeClr val="bg2">
-                    <a:lumMod val="10000"/>
-                  </a:schemeClr>
-                </a:solidFill>
-              </a:rPr>
-              <a:t>Any number of channels can be selected. There is no maximum number of channels</a:t>
-            </a:r>
-          </a:p>
         </p:txBody>
       </p:sp>
+      <p:pic>
+        <p:nvPicPr>
+          <p:cNvPr id="5" name="Picture 4">
+            <a:extLst>
+              <a:ext uri="{FF2B5EF4-FFF2-40B4-BE49-F238E27FC236}">
+                <a16:creationId xmlns:a16="http://schemas.microsoft.com/office/drawing/2014/main" id="{C2722A3E-1CDF-4199-803E-DA3F2A13B319}"/>
+              </a:ext>
+            </a:extLst>
+          </p:cNvPr>
+          <p:cNvPicPr>
+            <a:picLocks noChangeAspect="1"/>
+          </p:cNvPicPr>
+          <p:nvPr/>
+        </p:nvPicPr>
+        <p:blipFill rotWithShape="1">
+          <a:blip r:embed="rId2"/>
+          <a:srcRect l="2408" t="3245" r="3695" b="4339"/>
+          <a:stretch/>
+        </p:blipFill>
+        <p:spPr>
+          <a:xfrm>
+            <a:off x="3722913" y="174171"/>
+            <a:ext cx="5333855" cy="4100286"/>
+          </a:xfrm>
+          <a:prstGeom prst="rect">
+            <a:avLst/>
+          </a:prstGeom>
+        </p:spPr>
+      </p:pic>
       <p:cxnSp>
         <p:nvCxnSpPr>
-          <p:cNvPr id="9" name="Straight Arrow Connector 8">
+          <p:cNvPr id="10" name="Straight Arrow Connector 9">
             <a:extLst>
               <a:ext uri="{FF2B5EF4-FFF2-40B4-BE49-F238E27FC236}">
-                <a16:creationId xmlns:a16="http://schemas.microsoft.com/office/drawing/2014/main" id="{DBBC2E23-33C2-4580-9932-262FD2721F28}"/>
+                <a16:creationId xmlns:a16="http://schemas.microsoft.com/office/drawing/2014/main" id="{6EA6F132-E5EF-4CA9-AFBC-CEC60F3117E0}"/>
               </a:ext>
             </a:extLst>
           </p:cNvPr>
@@ -2586,8 +2696,8 @@
         </p:nvCxnSpPr>
         <p:spPr>
           <a:xfrm>
-            <a:off x="3287488" y="1526177"/>
-            <a:ext cx="1284512" cy="1129937"/>
+            <a:off x="2656114" y="2067802"/>
+            <a:ext cx="2365829" cy="218198"/>
           </a:xfrm>
           <a:prstGeom prst="straightConnector1">
             <a:avLst/>
@@ -2622,7 +2732,7 @@
           <p:cNvPr id="12" name="Straight Arrow Connector 11">
             <a:extLst>
               <a:ext uri="{FF2B5EF4-FFF2-40B4-BE49-F238E27FC236}">
-                <a16:creationId xmlns:a16="http://schemas.microsoft.com/office/drawing/2014/main" id="{A4368FF3-3DA3-49BC-B488-3AB1FF7FC66E}"/>
+                <a16:creationId xmlns:a16="http://schemas.microsoft.com/office/drawing/2014/main" id="{F2B69F9D-EC1C-48F6-93CA-62D973CDD86B}"/>
               </a:ext>
             </a:extLst>
           </p:cNvPr>
@@ -2632,9 +2742,9 @@
           <p:nvPr/>
         </p:nvCxnSpPr>
         <p:spPr>
-          <a:xfrm>
-            <a:off x="3022456" y="2808514"/>
-            <a:ext cx="4270973" cy="354038"/>
+          <a:xfrm flipV="1">
+            <a:off x="3635681" y="2602299"/>
+            <a:ext cx="1103233" cy="255203"/>
           </a:xfrm>
           <a:prstGeom prst="straightConnector1">
             <a:avLst/>
@@ -2666,10 +2776,10 @@
       </p:cxnSp>
       <p:sp>
         <p:nvSpPr>
-          <p:cNvPr id="14" name="Rectangle 13">
+          <p:cNvPr id="15" name="Rectangle 14">
             <a:extLst>
               <a:ext uri="{FF2B5EF4-FFF2-40B4-BE49-F238E27FC236}">
-                <a16:creationId xmlns:a16="http://schemas.microsoft.com/office/drawing/2014/main" id="{A0BDA6E4-4ED6-4472-9D97-D99CAE05C084}"/>
+                <a16:creationId xmlns:a16="http://schemas.microsoft.com/office/drawing/2014/main" id="{5439FF8D-892E-4870-82FF-80E264EC64DF}"/>
               </a:ext>
             </a:extLst>
           </p:cNvPr>
@@ -2678,8 +2788,8 @@
         </p:nvSpPr>
         <p:spPr>
           <a:xfrm>
-            <a:off x="4630057" y="2311400"/>
-            <a:ext cx="1785111" cy="1738086"/>
+            <a:off x="4789715" y="2402115"/>
+            <a:ext cx="1676399" cy="1558765"/>
           </a:xfrm>
           <a:prstGeom prst="rect">
             <a:avLst/>
@@ -2717,10 +2827,10 @@
       </p:sp>
       <p:sp>
         <p:nvSpPr>
-          <p:cNvPr id="15" name="Rectangle 14">
+          <p:cNvPr id="16" name="Rectangle 15">
             <a:extLst>
               <a:ext uri="{FF2B5EF4-FFF2-40B4-BE49-F238E27FC236}">
-                <a16:creationId xmlns:a16="http://schemas.microsoft.com/office/drawing/2014/main" id="{DE88E90F-2E16-461F-A882-DC9739EC34ED}"/>
+                <a16:creationId xmlns:a16="http://schemas.microsoft.com/office/drawing/2014/main" id="{C7CB179C-31FE-44FD-8898-60A354AFA6E0}"/>
               </a:ext>
             </a:extLst>
           </p:cNvPr>
@@ -2729,8 +2839,8 @@
         </p:nvSpPr>
         <p:spPr>
           <a:xfrm>
-            <a:off x="7351486" y="2260600"/>
-            <a:ext cx="1690914" cy="1788886"/>
+            <a:off x="5050897" y="2153367"/>
+            <a:ext cx="1182989" cy="218199"/>
           </a:xfrm>
           <a:prstGeom prst="rect">
             <a:avLst/>
@@ -2769,7 +2879,7 @@
     </p:spTree>
     <p:extLst>
       <p:ext uri="{BB962C8B-B14F-4D97-AF65-F5344CB8AC3E}">
-        <p14:creationId xmlns:p14="http://schemas.microsoft.com/office/powerpoint/2010/main" val="2836014920"/>
+        <p14:creationId xmlns:p14="http://schemas.microsoft.com/office/powerpoint/2010/main" val="3144142810"/>
       </p:ext>
     </p:extLst>
   </p:cSld>
@@ -2849,99 +2959,12 @@
           </a:p>
         </p:txBody>
       </p:sp>
-      <p:sp>
-        <p:nvSpPr>
-          <p:cNvPr id="8" name="TextBox 7">
-            <a:extLst>
-              <a:ext uri="{FF2B5EF4-FFF2-40B4-BE49-F238E27FC236}">
-                <a16:creationId xmlns:a16="http://schemas.microsoft.com/office/drawing/2014/main" id="{88295796-913B-40C7-B761-F850BCF22A3F}"/>
-              </a:ext>
-            </a:extLst>
-          </p:cNvPr>
-          <p:cNvSpPr txBox="1"/>
-          <p:nvPr/>
-        </p:nvSpPr>
-        <p:spPr>
-          <a:xfrm>
-            <a:off x="87231" y="328865"/>
-            <a:ext cx="3635683" cy="3477875"/>
-          </a:xfrm>
-          <a:prstGeom prst="rect">
-            <a:avLst/>
-          </a:prstGeom>
-          <a:noFill/>
-        </p:spPr>
-        <p:txBody>
-          <a:bodyPr wrap="square" rtlCol="0">
-            <a:spAutoFit/>
-          </a:bodyPr>
-          <a:lstStyle/>
-          <a:p>
-            <a:pPr marL="457200" indent="-457200">
-              <a:buFont typeface="Arial" panose="020B0604020202020204" pitchFamily="34" charset="0"/>
-              <a:buChar char="•"/>
-            </a:pPr>
-            <a:r>
-              <a:rPr lang="en-US" sz="2000" dirty="0">
-                <a:solidFill>
-                  <a:schemeClr val="bg2">
-                    <a:lumMod val="10000"/>
-                  </a:schemeClr>
-                </a:solidFill>
-              </a:rPr>
-              <a:t>To select a different channel, simply delete what was previously typed in the search box and begin typing the name of the new channel </a:t>
-            </a:r>
-          </a:p>
-          <a:p>
-            <a:pPr marL="457200" indent="-457200">
-              <a:buFont typeface="Arial" panose="020B0604020202020204" pitchFamily="34" charset="0"/>
-              <a:buChar char="•"/>
-            </a:pPr>
-            <a:endParaRPr lang="en-US" sz="2000" dirty="0">
-              <a:solidFill>
-                <a:schemeClr val="bg2">
-                  <a:lumMod val="10000"/>
-                </a:schemeClr>
-              </a:solidFill>
-            </a:endParaRPr>
-          </a:p>
-          <a:p>
-            <a:pPr marL="457200" indent="-457200">
-              <a:buFont typeface="Arial" panose="020B0604020202020204" pitchFamily="34" charset="0"/>
-              <a:buChar char="•"/>
-            </a:pPr>
-            <a:r>
-              <a:rPr lang="en-US" sz="2000" dirty="0">
-                <a:solidFill>
-                  <a:schemeClr val="bg2">
-                    <a:lumMod val="10000"/>
-                  </a:schemeClr>
-                </a:solidFill>
-              </a:rPr>
-              <a:t>Select the new channel by double clicking it (same as before)</a:t>
-            </a:r>
-          </a:p>
-          <a:p>
-            <a:pPr marL="457200" indent="-457200">
-              <a:buFont typeface="Arial" panose="020B0604020202020204" pitchFamily="34" charset="0"/>
-              <a:buChar char="•"/>
-            </a:pPr>
-            <a:endParaRPr lang="en-US" sz="2000" dirty="0">
-              <a:solidFill>
-                <a:schemeClr val="bg2">
-                  <a:lumMod val="10000"/>
-                </a:schemeClr>
-              </a:solidFill>
-            </a:endParaRPr>
-          </a:p>
-        </p:txBody>
-      </p:sp>
       <p:pic>
         <p:nvPicPr>
-          <p:cNvPr id="5" name="Picture 4">
+          <p:cNvPr id="8" name="Picture 7">
             <a:extLst>
               <a:ext uri="{FF2B5EF4-FFF2-40B4-BE49-F238E27FC236}">
-                <a16:creationId xmlns:a16="http://schemas.microsoft.com/office/drawing/2014/main" id="{C2722A3E-1CDF-4199-803E-DA3F2A13B319}"/>
+                <a16:creationId xmlns:a16="http://schemas.microsoft.com/office/drawing/2014/main" id="{C9B5FD1B-2DEA-42F3-BB11-75465A8F2AB4}"/>
               </a:ext>
             </a:extLst>
           </p:cNvPr>
@@ -2957,20 +2980,119 @@
         </p:blipFill>
         <p:spPr>
           <a:xfrm>
-            <a:off x="3722913" y="174171"/>
-            <a:ext cx="5333855" cy="4100286"/>
+            <a:off x="1549399" y="147863"/>
+            <a:ext cx="6045201" cy="4100286"/>
           </a:xfrm>
           <a:prstGeom prst="rect">
             <a:avLst/>
           </a:prstGeom>
         </p:spPr>
       </p:pic>
+      <p:sp>
+        <p:nvSpPr>
+          <p:cNvPr id="9" name="Rectangle 8">
+            <a:extLst>
+              <a:ext uri="{FF2B5EF4-FFF2-40B4-BE49-F238E27FC236}">
+                <a16:creationId xmlns:a16="http://schemas.microsoft.com/office/drawing/2014/main" id="{3FB213D2-6B6E-45C3-833F-DF19A71B6821}"/>
+              </a:ext>
+            </a:extLst>
+          </p:cNvPr>
+          <p:cNvSpPr/>
+          <p:nvPr/>
+        </p:nvSpPr>
+        <p:spPr>
+          <a:xfrm>
+            <a:off x="4187370" y="3743778"/>
+            <a:ext cx="769257" cy="504371"/>
+          </a:xfrm>
+          <a:prstGeom prst="rect">
+            <a:avLst/>
+          </a:prstGeom>
+          <a:noFill/>
+          <a:ln w="19050">
+            <a:solidFill>
+              <a:srgbClr val="FF0000"/>
+            </a:solidFill>
+          </a:ln>
+          <a:effectLst/>
+        </p:spPr>
+        <p:style>
+          <a:lnRef idx="1">
+            <a:schemeClr val="accent1"/>
+          </a:lnRef>
+          <a:fillRef idx="3">
+            <a:schemeClr val="accent1"/>
+          </a:fillRef>
+          <a:effectRef idx="2">
+            <a:schemeClr val="accent1"/>
+          </a:effectRef>
+          <a:fontRef idx="minor">
+            <a:schemeClr val="lt1"/>
+          </a:fontRef>
+        </p:style>
+        <p:txBody>
+          <a:bodyPr rtlCol="0" anchor="ctr"/>
+          <a:lstStyle/>
+          <a:p>
+            <a:pPr algn="ctr"/>
+            <a:endParaRPr lang="en-US"/>
+          </a:p>
+        </p:txBody>
+      </p:sp>
+      <p:sp>
+        <p:nvSpPr>
+          <p:cNvPr id="10" name="TextBox 9">
+            <a:extLst>
+              <a:ext uri="{FF2B5EF4-FFF2-40B4-BE49-F238E27FC236}">
+                <a16:creationId xmlns:a16="http://schemas.microsoft.com/office/drawing/2014/main" id="{B0C8E787-A41D-449C-92AE-51701F311A9A}"/>
+              </a:ext>
+            </a:extLst>
+          </p:cNvPr>
+          <p:cNvSpPr txBox="1"/>
+          <p:nvPr/>
+        </p:nvSpPr>
+        <p:spPr>
+          <a:xfrm>
+            <a:off x="1293476" y="4205067"/>
+            <a:ext cx="1822185" cy="923330"/>
+          </a:xfrm>
+          <a:prstGeom prst="rect">
+            <a:avLst/>
+          </a:prstGeom>
+          <a:noFill/>
+          <a:ln w="19050">
+            <a:solidFill>
+              <a:schemeClr val="bg2">
+                <a:lumMod val="10000"/>
+              </a:schemeClr>
+            </a:solidFill>
+          </a:ln>
+        </p:spPr>
+        <p:txBody>
+          <a:bodyPr wrap="square" rtlCol="0">
+            <a:spAutoFit/>
+          </a:bodyPr>
+          <a:lstStyle/>
+          <a:p>
+            <a:r>
+              <a:rPr lang="en-US" dirty="0">
+                <a:solidFill>
+                  <a:schemeClr val="bg2">
+                    <a:lumMod val="10000"/>
+                  </a:schemeClr>
+                </a:solidFill>
+              </a:rPr>
+              <a:t>Click the “Plot” button to plot the data</a:t>
+            </a:r>
+          </a:p>
+        </p:txBody>
+      </p:sp>
       <p:cxnSp>
         <p:nvCxnSpPr>
-          <p:cNvPr id="10" name="Straight Arrow Connector 9">
+          <p:cNvPr id="11" name="Straight Arrow Connector 10">
             <a:extLst>
               <a:ext uri="{FF2B5EF4-FFF2-40B4-BE49-F238E27FC236}">
-                <a16:creationId xmlns:a16="http://schemas.microsoft.com/office/drawing/2014/main" id="{6EA6F132-E5EF-4CA9-AFBC-CEC60F3117E0}"/>
+                <a16:creationId xmlns:a16="http://schemas.microsoft.com/office/drawing/2014/main" id="{893182E8-8ABD-41D7-8661-924FAA804890}"/>
               </a:ext>
             </a:extLst>
           </p:cNvPr>
@@ -2980,9 +3102,9 @@
           <p:nvPr/>
         </p:nvCxnSpPr>
         <p:spPr>
-          <a:xfrm>
-            <a:off x="2656114" y="2067802"/>
-            <a:ext cx="2365829" cy="218198"/>
+          <a:xfrm flipV="1">
+            <a:off x="3151946" y="3995963"/>
+            <a:ext cx="962854" cy="365580"/>
           </a:xfrm>
           <a:prstGeom prst="straightConnector1">
             <a:avLst/>
@@ -3012,159 +3134,10 @@
           </a:fontRef>
         </p:style>
       </p:cxnSp>
-      <p:cxnSp>
-        <p:nvCxnSpPr>
-          <p:cNvPr id="12" name="Straight Arrow Connector 11">
-            <a:extLst>
-              <a:ext uri="{FF2B5EF4-FFF2-40B4-BE49-F238E27FC236}">
-                <a16:creationId xmlns:a16="http://schemas.microsoft.com/office/drawing/2014/main" id="{F2B69F9D-EC1C-48F6-93CA-62D973CDD86B}"/>
-              </a:ext>
-            </a:extLst>
-          </p:cNvPr>
-          <p:cNvCxnSpPr>
-            <a:cxnSpLocks/>
-          </p:cNvCxnSpPr>
-          <p:nvPr/>
-        </p:nvCxnSpPr>
-        <p:spPr>
-          <a:xfrm flipV="1">
-            <a:off x="3635681" y="2602299"/>
-            <a:ext cx="1103233" cy="255203"/>
-          </a:xfrm>
-          <a:prstGeom prst="straightConnector1">
-            <a:avLst/>
-          </a:prstGeom>
-          <a:ln>
-            <a:solidFill>
-              <a:schemeClr val="bg2">
-                <a:lumMod val="10000"/>
-              </a:schemeClr>
-            </a:solidFill>
-            <a:tailEnd type="triangle"/>
-          </a:ln>
-          <a:effectLst/>
-        </p:spPr>
-        <p:style>
-          <a:lnRef idx="2">
-            <a:schemeClr val="accent1"/>
-          </a:lnRef>
-          <a:fillRef idx="0">
-            <a:schemeClr val="accent1"/>
-          </a:fillRef>
-          <a:effectRef idx="1">
-            <a:schemeClr val="accent1"/>
-          </a:effectRef>
-          <a:fontRef idx="minor">
-            <a:schemeClr val="tx1"/>
-          </a:fontRef>
-        </p:style>
-      </p:cxnSp>
-      <p:sp>
-        <p:nvSpPr>
-          <p:cNvPr id="15" name="Rectangle 14">
-            <a:extLst>
-              <a:ext uri="{FF2B5EF4-FFF2-40B4-BE49-F238E27FC236}">
-                <a16:creationId xmlns:a16="http://schemas.microsoft.com/office/drawing/2014/main" id="{5439FF8D-892E-4870-82FF-80E264EC64DF}"/>
-              </a:ext>
-            </a:extLst>
-          </p:cNvPr>
-          <p:cNvSpPr/>
-          <p:nvPr/>
-        </p:nvSpPr>
-        <p:spPr>
-          <a:xfrm>
-            <a:off x="4789715" y="2402115"/>
-            <a:ext cx="1676399" cy="1558765"/>
-          </a:xfrm>
-          <a:prstGeom prst="rect">
-            <a:avLst/>
-          </a:prstGeom>
-          <a:noFill/>
-          <a:ln w="19050">
-            <a:solidFill>
-              <a:srgbClr val="FF0000"/>
-            </a:solidFill>
-          </a:ln>
-          <a:effectLst/>
-        </p:spPr>
-        <p:style>
-          <a:lnRef idx="1">
-            <a:schemeClr val="accent1"/>
-          </a:lnRef>
-          <a:fillRef idx="3">
-            <a:schemeClr val="accent1"/>
-          </a:fillRef>
-          <a:effectRef idx="2">
-            <a:schemeClr val="accent1"/>
-          </a:effectRef>
-          <a:fontRef idx="minor">
-            <a:schemeClr val="lt1"/>
-          </a:fontRef>
-        </p:style>
-        <p:txBody>
-          <a:bodyPr rtlCol="0" anchor="ctr"/>
-          <a:lstStyle/>
-          <a:p>
-            <a:pPr algn="ctr"/>
-            <a:endParaRPr lang="en-US"/>
-          </a:p>
-        </p:txBody>
-      </p:sp>
-      <p:sp>
-        <p:nvSpPr>
-          <p:cNvPr id="16" name="Rectangle 15">
-            <a:extLst>
-              <a:ext uri="{FF2B5EF4-FFF2-40B4-BE49-F238E27FC236}">
-                <a16:creationId xmlns:a16="http://schemas.microsoft.com/office/drawing/2014/main" id="{C7CB179C-31FE-44FD-8898-60A354AFA6E0}"/>
-              </a:ext>
-            </a:extLst>
-          </p:cNvPr>
-          <p:cNvSpPr/>
-          <p:nvPr/>
-        </p:nvSpPr>
-        <p:spPr>
-          <a:xfrm>
-            <a:off x="5050897" y="2153367"/>
-            <a:ext cx="1182989" cy="218199"/>
-          </a:xfrm>
-          <a:prstGeom prst="rect">
-            <a:avLst/>
-          </a:prstGeom>
-          <a:noFill/>
-          <a:ln w="19050">
-            <a:solidFill>
-              <a:srgbClr val="FF0000"/>
-            </a:solidFill>
-          </a:ln>
-          <a:effectLst/>
-        </p:spPr>
-        <p:style>
-          <a:lnRef idx="1">
-            <a:schemeClr val="accent1"/>
-          </a:lnRef>
-          <a:fillRef idx="3">
-            <a:schemeClr val="accent1"/>
-          </a:fillRef>
-          <a:effectRef idx="2">
-            <a:schemeClr val="accent1"/>
-          </a:effectRef>
-          <a:fontRef idx="minor">
-            <a:schemeClr val="lt1"/>
-          </a:fontRef>
-        </p:style>
-        <p:txBody>
-          <a:bodyPr rtlCol="0" anchor="ctr"/>
-          <a:lstStyle/>
-          <a:p>
-            <a:pPr algn="ctr"/>
-            <a:endParaRPr lang="en-US"/>
-          </a:p>
-        </p:txBody>
-      </p:sp>
     </p:spTree>
     <p:extLst>
       <p:ext uri="{BB962C8B-B14F-4D97-AF65-F5344CB8AC3E}">
-        <p14:creationId xmlns:p14="http://schemas.microsoft.com/office/powerpoint/2010/main" val="3144142810"/>
+        <p14:creationId xmlns:p14="http://schemas.microsoft.com/office/powerpoint/2010/main" val="2091122279"/>
       </p:ext>
     </p:extLst>
   </p:cSld>
@@ -3246,10 +3219,10 @@
       </p:sp>
       <p:pic>
         <p:nvPicPr>
-          <p:cNvPr id="8" name="Picture 7">
+          <p:cNvPr id="2" name="Picture 1">
             <a:extLst>
               <a:ext uri="{FF2B5EF4-FFF2-40B4-BE49-F238E27FC236}">
-                <a16:creationId xmlns:a16="http://schemas.microsoft.com/office/drawing/2014/main" id="{C9B5FD1B-2DEA-42F3-BB11-75465A8F2AB4}"/>
+                <a16:creationId xmlns:a16="http://schemas.microsoft.com/office/drawing/2014/main" id="{402418C9-ADE2-447E-AED7-A522B2C0E978}"/>
               </a:ext>
             </a:extLst>
           </p:cNvPr>
@@ -3258,15 +3231,16 @@
           </p:cNvPicPr>
           <p:nvPr/>
         </p:nvPicPr>
-        <p:blipFill rotWithShape="1">
+        <p:blipFill>
           <a:blip r:embed="rId2"/>
-          <a:srcRect l="2408" t="3245" r="3695" b="4339"/>
-          <a:stretch/>
+          <a:stretch>
+            <a:fillRect/>
+          </a:stretch>
         </p:blipFill>
         <p:spPr>
           <a:xfrm>
-            <a:off x="1549399" y="147863"/>
-            <a:ext cx="6045201" cy="4100286"/>
+            <a:off x="1042284" y="645886"/>
+            <a:ext cx="7059427" cy="3735614"/>
           </a:xfrm>
           <a:prstGeom prst="rect">
             <a:avLst/>
@@ -3275,61 +3249,10 @@
       </p:pic>
       <p:sp>
         <p:nvSpPr>
-          <p:cNvPr id="9" name="Rectangle 8">
+          <p:cNvPr id="8" name="TextBox 7">
             <a:extLst>
               <a:ext uri="{FF2B5EF4-FFF2-40B4-BE49-F238E27FC236}">
-                <a16:creationId xmlns:a16="http://schemas.microsoft.com/office/drawing/2014/main" id="{3FB213D2-6B6E-45C3-833F-DF19A71B6821}"/>
-              </a:ext>
-            </a:extLst>
-          </p:cNvPr>
-          <p:cNvSpPr/>
-          <p:nvPr/>
-        </p:nvSpPr>
-        <p:spPr>
-          <a:xfrm>
-            <a:off x="4187370" y="3743778"/>
-            <a:ext cx="769257" cy="504371"/>
-          </a:xfrm>
-          <a:prstGeom prst="rect">
-            <a:avLst/>
-          </a:prstGeom>
-          <a:noFill/>
-          <a:ln w="19050">
-            <a:solidFill>
-              <a:srgbClr val="FF0000"/>
-            </a:solidFill>
-          </a:ln>
-          <a:effectLst/>
-        </p:spPr>
-        <p:style>
-          <a:lnRef idx="1">
-            <a:schemeClr val="accent1"/>
-          </a:lnRef>
-          <a:fillRef idx="3">
-            <a:schemeClr val="accent1"/>
-          </a:fillRef>
-          <a:effectRef idx="2">
-            <a:schemeClr val="accent1"/>
-          </a:effectRef>
-          <a:fontRef idx="minor">
-            <a:schemeClr val="lt1"/>
-          </a:fontRef>
-        </p:style>
-        <p:txBody>
-          <a:bodyPr rtlCol="0" anchor="ctr"/>
-          <a:lstStyle/>
-          <a:p>
-            <a:pPr algn="ctr"/>
-            <a:endParaRPr lang="en-US"/>
-          </a:p>
-        </p:txBody>
-      </p:sp>
-      <p:sp>
-        <p:nvSpPr>
-          <p:cNvPr id="10" name="TextBox 9">
-            <a:extLst>
-              <a:ext uri="{FF2B5EF4-FFF2-40B4-BE49-F238E27FC236}">
-                <a16:creationId xmlns:a16="http://schemas.microsoft.com/office/drawing/2014/main" id="{B0C8E787-A41D-449C-92AE-51701F311A9A}"/>
+                <a16:creationId xmlns:a16="http://schemas.microsoft.com/office/drawing/2014/main" id="{700D9D95-181F-441A-9FD7-A195A328A1B1}"/>
               </a:ext>
             </a:extLst>
           </p:cNvPr>
@@ -3338,20 +3261,13 @@
         </p:nvSpPr>
         <p:spPr>
           <a:xfrm>
-            <a:off x="1209166" y="3995963"/>
-            <a:ext cx="1822185" cy="923330"/>
+            <a:off x="805541" y="61111"/>
+            <a:ext cx="7772402" cy="584775"/>
           </a:xfrm>
           <a:prstGeom prst="rect">
             <a:avLst/>
           </a:prstGeom>
           <a:noFill/>
-          <a:ln w="19050">
-            <a:solidFill>
-              <a:schemeClr val="bg2">
-                <a:lumMod val="10000"/>
-              </a:schemeClr>
-            </a:solidFill>
-          </a:ln>
         </p:spPr>
         <p:txBody>
           <a:bodyPr wrap="square" rtlCol="0">
@@ -3360,69 +3276,63 @@
           <a:lstStyle/>
           <a:p>
             <a:r>
-              <a:rPr lang="en-US" dirty="0">
+              <a:rPr lang="en-US" sz="3200" dirty="0">
                 <a:solidFill>
                   <a:schemeClr val="bg2">
                     <a:lumMod val="10000"/>
                   </a:schemeClr>
                 </a:solidFill>
               </a:rPr>
-              <a:t>Click the “Plot” button the plot the data</a:t>
+              <a:t>This is the graph of the channels selected</a:t>
             </a:r>
           </a:p>
         </p:txBody>
       </p:sp>
-      <p:cxnSp>
-        <p:nvCxnSpPr>
-          <p:cNvPr id="11" name="Straight Arrow Connector 10">
+      <p:sp>
+        <p:nvSpPr>
+          <p:cNvPr id="9" name="TextBox 8">
             <a:extLst>
               <a:ext uri="{FF2B5EF4-FFF2-40B4-BE49-F238E27FC236}">
-                <a16:creationId xmlns:a16="http://schemas.microsoft.com/office/drawing/2014/main" id="{893182E8-8ABD-41D7-8661-924FAA804890}"/>
+                <a16:creationId xmlns:a16="http://schemas.microsoft.com/office/drawing/2014/main" id="{30C10759-C8F3-4A98-8254-1DF0D22DB3E0}"/>
               </a:ext>
             </a:extLst>
           </p:cNvPr>
-          <p:cNvCxnSpPr>
-            <a:cxnSpLocks/>
-          </p:cNvCxnSpPr>
+          <p:cNvSpPr txBox="1"/>
           <p:nvPr/>
-        </p:nvCxnSpPr>
-        <p:spPr>
-          <a:xfrm flipV="1">
-            <a:off x="3151946" y="3995963"/>
-            <a:ext cx="962854" cy="365580"/>
-          </a:xfrm>
-          <a:prstGeom prst="straightConnector1">
-            <a:avLst/>
-          </a:prstGeom>
-          <a:ln>
-            <a:solidFill>
-              <a:schemeClr val="bg2">
-                <a:lumMod val="10000"/>
-              </a:schemeClr>
-            </a:solidFill>
-            <a:tailEnd type="triangle"/>
-          </a:ln>
-          <a:effectLst/>
-        </p:spPr>
-        <p:style>
-          <a:lnRef idx="2">
-            <a:schemeClr val="accent1"/>
-          </a:lnRef>
-          <a:fillRef idx="0">
-            <a:schemeClr val="accent1"/>
-          </a:fillRef>
-          <a:effectRef idx="1">
-            <a:schemeClr val="accent1"/>
-          </a:effectRef>
-          <a:fontRef idx="minor">
-            <a:schemeClr val="tx1"/>
-          </a:fontRef>
-        </p:style>
-      </p:cxnSp>
+        </p:nvSpPr>
+        <p:spPr>
+          <a:xfrm>
+            <a:off x="239483" y="4157842"/>
+            <a:ext cx="3294745" cy="830997"/>
+          </a:xfrm>
+          <a:prstGeom prst="rect">
+            <a:avLst/>
+          </a:prstGeom>
+          <a:noFill/>
+        </p:spPr>
+        <p:txBody>
+          <a:bodyPr wrap="square" rtlCol="0">
+            <a:spAutoFit/>
+          </a:bodyPr>
+          <a:lstStyle/>
+          <a:p>
+            <a:r>
+              <a:rPr lang="en-US" sz="1200" dirty="0">
+                <a:solidFill>
+                  <a:schemeClr val="bg2">
+                    <a:lumMod val="10000"/>
+                  </a:schemeClr>
+                </a:solidFill>
+              </a:rPr>
+              <a:t>NOTE: All the channels are plotted versus time. This means that time, in seconds, will always be the X-axis, and the channels selected will be on the Y-axis </a:t>
+            </a:r>
+          </a:p>
+        </p:txBody>
+      </p:sp>
     </p:spTree>
     <p:extLst>
       <p:ext uri="{BB962C8B-B14F-4D97-AF65-F5344CB8AC3E}">
-        <p14:creationId xmlns:p14="http://schemas.microsoft.com/office/powerpoint/2010/main" val="2091122279"/>
+        <p14:creationId xmlns:p14="http://schemas.microsoft.com/office/powerpoint/2010/main" val="2265971316"/>
       </p:ext>
     </p:extLst>
   </p:cSld>
@@ -3502,201 +3412,6 @@
           </a:p>
         </p:txBody>
       </p:sp>
-      <p:pic>
-        <p:nvPicPr>
-          <p:cNvPr id="2" name="Picture 1">
-            <a:extLst>
-              <a:ext uri="{FF2B5EF4-FFF2-40B4-BE49-F238E27FC236}">
-                <a16:creationId xmlns:a16="http://schemas.microsoft.com/office/drawing/2014/main" id="{402418C9-ADE2-447E-AED7-A522B2C0E978}"/>
-              </a:ext>
-            </a:extLst>
-          </p:cNvPr>
-          <p:cNvPicPr>
-            <a:picLocks noChangeAspect="1"/>
-          </p:cNvPicPr>
-          <p:nvPr/>
-        </p:nvPicPr>
-        <p:blipFill>
-          <a:blip r:embed="rId2"/>
-          <a:stretch>
-            <a:fillRect/>
-          </a:stretch>
-        </p:blipFill>
-        <p:spPr>
-          <a:xfrm>
-            <a:off x="1042284" y="645886"/>
-            <a:ext cx="7059427" cy="3735614"/>
-          </a:xfrm>
-          <a:prstGeom prst="rect">
-            <a:avLst/>
-          </a:prstGeom>
-        </p:spPr>
-      </p:pic>
-      <p:sp>
-        <p:nvSpPr>
-          <p:cNvPr id="8" name="TextBox 7">
-            <a:extLst>
-              <a:ext uri="{FF2B5EF4-FFF2-40B4-BE49-F238E27FC236}">
-                <a16:creationId xmlns:a16="http://schemas.microsoft.com/office/drawing/2014/main" id="{700D9D95-181F-441A-9FD7-A195A328A1B1}"/>
-              </a:ext>
-            </a:extLst>
-          </p:cNvPr>
-          <p:cNvSpPr txBox="1"/>
-          <p:nvPr/>
-        </p:nvSpPr>
-        <p:spPr>
-          <a:xfrm>
-            <a:off x="805541" y="61111"/>
-            <a:ext cx="7772402" cy="584775"/>
-          </a:xfrm>
-          <a:prstGeom prst="rect">
-            <a:avLst/>
-          </a:prstGeom>
-          <a:noFill/>
-        </p:spPr>
-        <p:txBody>
-          <a:bodyPr wrap="square" rtlCol="0">
-            <a:spAutoFit/>
-          </a:bodyPr>
-          <a:lstStyle/>
-          <a:p>
-            <a:r>
-              <a:rPr lang="en-US" sz="3200" dirty="0">
-                <a:solidFill>
-                  <a:schemeClr val="bg2">
-                    <a:lumMod val="10000"/>
-                  </a:schemeClr>
-                </a:solidFill>
-              </a:rPr>
-              <a:t>This is the graph of the channels selected</a:t>
-            </a:r>
-          </a:p>
-        </p:txBody>
-      </p:sp>
-      <p:sp>
-        <p:nvSpPr>
-          <p:cNvPr id="9" name="TextBox 8">
-            <a:extLst>
-              <a:ext uri="{FF2B5EF4-FFF2-40B4-BE49-F238E27FC236}">
-                <a16:creationId xmlns:a16="http://schemas.microsoft.com/office/drawing/2014/main" id="{30C10759-C8F3-4A98-8254-1DF0D22DB3E0}"/>
-              </a:ext>
-            </a:extLst>
-          </p:cNvPr>
-          <p:cNvSpPr txBox="1"/>
-          <p:nvPr/>
-        </p:nvSpPr>
-        <p:spPr>
-          <a:xfrm>
-            <a:off x="239483" y="4157842"/>
-            <a:ext cx="3294745" cy="830997"/>
-          </a:xfrm>
-          <a:prstGeom prst="rect">
-            <a:avLst/>
-          </a:prstGeom>
-          <a:noFill/>
-        </p:spPr>
-        <p:txBody>
-          <a:bodyPr wrap="square" rtlCol="0">
-            <a:spAutoFit/>
-          </a:bodyPr>
-          <a:lstStyle/>
-          <a:p>
-            <a:r>
-              <a:rPr lang="en-US" sz="1200" dirty="0">
-                <a:solidFill>
-                  <a:schemeClr val="bg2">
-                    <a:lumMod val="10000"/>
-                  </a:schemeClr>
-                </a:solidFill>
-              </a:rPr>
-              <a:t>NOTE: All the channels are plotted versus time. This means that time, in seconds, will always be the X-axis, and the channels selected will be on the Y-axis </a:t>
-            </a:r>
-          </a:p>
-        </p:txBody>
-      </p:sp>
-    </p:spTree>
-    <p:extLst>
-      <p:ext uri="{BB962C8B-B14F-4D97-AF65-F5344CB8AC3E}">
-        <p14:creationId xmlns:p14="http://schemas.microsoft.com/office/powerpoint/2010/main" val="2265971316"/>
-      </p:ext>
-    </p:extLst>
-  </p:cSld>
-  <p:clrMapOvr>
-    <a:masterClrMapping/>
-  </p:clrMapOvr>
-</p:sld>
-</file>
-
-<file path=ppt/slides/slide15.xml><?xml version="1.0" encoding="utf-8"?>
-<p:sld xmlns:a="http://schemas.openxmlformats.org/drawingml/2006/main" xmlns:r="http://schemas.openxmlformats.org/officeDocument/2006/relationships" xmlns:p="http://schemas.openxmlformats.org/presentationml/2006/main">
-  <p:cSld>
-    <p:spTree>
-      <p:nvGrpSpPr>
-        <p:cNvPr id="1" name=""/>
-        <p:cNvGrpSpPr/>
-        <p:nvPr/>
-      </p:nvGrpSpPr>
-      <p:grpSpPr>
-        <a:xfrm>
-          <a:off x="0" y="0"/>
-          <a:ext cx="0" cy="0"/>
-          <a:chOff x="0" y="0"/>
-          <a:chExt cx="0" cy="0"/>
-        </a:xfrm>
-      </p:grpSpPr>
-      <p:sp>
-        <p:nvSpPr>
-          <p:cNvPr id="4" name="Rectangle 3">
-            <a:extLst>
-              <a:ext uri="{FF2B5EF4-FFF2-40B4-BE49-F238E27FC236}">
-                <a16:creationId xmlns:a16="http://schemas.microsoft.com/office/drawing/2014/main" id="{97EF6C37-5DF7-4404-858A-16BCDB7D0EE7}"/>
-              </a:ext>
-            </a:extLst>
-          </p:cNvPr>
-          <p:cNvSpPr/>
-          <p:nvPr/>
-        </p:nvSpPr>
-        <p:spPr>
-          <a:xfrm>
-            <a:off x="0" y="645886"/>
-            <a:ext cx="9144000" cy="1925864"/>
-          </a:xfrm>
-          <a:prstGeom prst="rect">
-            <a:avLst/>
-          </a:prstGeom>
-          <a:solidFill>
-            <a:schemeClr val="bg1"/>
-          </a:solidFill>
-          <a:ln>
-            <a:solidFill>
-              <a:schemeClr val="bg1"/>
-            </a:solidFill>
-          </a:ln>
-          <a:effectLst/>
-        </p:spPr>
-        <p:style>
-          <a:lnRef idx="1">
-            <a:schemeClr val="accent1"/>
-          </a:lnRef>
-          <a:fillRef idx="3">
-            <a:schemeClr val="accent1"/>
-          </a:fillRef>
-          <a:effectRef idx="2">
-            <a:schemeClr val="accent1"/>
-          </a:effectRef>
-          <a:fontRef idx="minor">
-            <a:schemeClr val="lt1"/>
-          </a:fontRef>
-        </p:style>
-        <p:txBody>
-          <a:bodyPr rtlCol="0" anchor="ctr"/>
-          <a:lstStyle/>
-          <a:p>
-            <a:pPr algn="ctr"/>
-            <a:endParaRPr lang="en-US"/>
-          </a:p>
-        </p:txBody>
-      </p:sp>
       <p:sp>
         <p:nvSpPr>
           <p:cNvPr id="8" name="TextBox 7">
@@ -3953,7 +3668,7 @@
 </p:sld>
 </file>
 
-<file path=ppt/slides/slide16.xml><?xml version="1.0" encoding="utf-8"?>
+<file path=ppt/slides/slide15.xml><?xml version="1.0" encoding="utf-8"?>
 <p:sld xmlns:a="http://schemas.openxmlformats.org/drawingml/2006/main" xmlns:r="http://schemas.openxmlformats.org/officeDocument/2006/relationships" xmlns:p="http://schemas.openxmlformats.org/presentationml/2006/main">
   <p:cSld>
     <p:spTree>
@@ -4281,140 +3996,12 @@
           </a:p>
         </p:txBody>
       </p:sp>
-      <p:pic>
-        <p:nvPicPr>
-          <p:cNvPr id="5" name="Picture 4">
-            <a:extLst>
-              <a:ext uri="{FF2B5EF4-FFF2-40B4-BE49-F238E27FC236}">
-                <a16:creationId xmlns:a16="http://schemas.microsoft.com/office/drawing/2014/main" id="{05FD5EAE-DA50-40A2-9099-FB3E3FD995FB}"/>
-              </a:ext>
-            </a:extLst>
-          </p:cNvPr>
-          <p:cNvPicPr>
-            <a:picLocks noChangeAspect="1"/>
-          </p:cNvPicPr>
-          <p:nvPr/>
-        </p:nvPicPr>
-        <p:blipFill>
-          <a:blip r:embed="rId2"/>
-          <a:stretch>
-            <a:fillRect/>
-          </a:stretch>
-        </p:blipFill>
-        <p:spPr>
-          <a:xfrm>
-            <a:off x="848443" y="802980"/>
-            <a:ext cx="6685115" cy="3537540"/>
-          </a:xfrm>
-          <a:prstGeom prst="rect">
-            <a:avLst/>
-          </a:prstGeom>
-        </p:spPr>
-      </p:pic>
       <p:sp>
         <p:nvSpPr>
-          <p:cNvPr id="7" name="Rectangle 6">
+          <p:cNvPr id="3" name="TextBox 2">
             <a:extLst>
               <a:ext uri="{FF2B5EF4-FFF2-40B4-BE49-F238E27FC236}">
-                <a16:creationId xmlns:a16="http://schemas.microsoft.com/office/drawing/2014/main" id="{27C79C29-C64E-4F9B-AF4B-908C243501A0}"/>
-              </a:ext>
-            </a:extLst>
-          </p:cNvPr>
-          <p:cNvSpPr/>
-          <p:nvPr/>
-        </p:nvSpPr>
-        <p:spPr>
-          <a:xfrm>
-            <a:off x="1981200" y="1914676"/>
-            <a:ext cx="461350" cy="410323"/>
-          </a:xfrm>
-          <a:prstGeom prst="rect">
-            <a:avLst/>
-          </a:prstGeom>
-          <a:noFill/>
-          <a:ln w="19050">
-            <a:solidFill>
-              <a:srgbClr val="FF0000"/>
-            </a:solidFill>
-          </a:ln>
-          <a:effectLst/>
-        </p:spPr>
-        <p:style>
-          <a:lnRef idx="1">
-            <a:schemeClr val="accent1"/>
-          </a:lnRef>
-          <a:fillRef idx="3">
-            <a:schemeClr val="accent1"/>
-          </a:fillRef>
-          <a:effectRef idx="2">
-            <a:schemeClr val="accent1"/>
-          </a:effectRef>
-          <a:fontRef idx="minor">
-            <a:schemeClr val="lt1"/>
-          </a:fontRef>
-        </p:style>
-        <p:txBody>
-          <a:bodyPr rtlCol="0" anchor="ctr"/>
-          <a:lstStyle/>
-          <a:p>
-            <a:pPr algn="ctr"/>
-            <a:endParaRPr lang="en-US"/>
-          </a:p>
-        </p:txBody>
-      </p:sp>
-      <p:cxnSp>
-        <p:nvCxnSpPr>
-          <p:cNvPr id="9" name="Straight Arrow Connector 8">
-            <a:extLst>
-              <a:ext uri="{FF2B5EF4-FFF2-40B4-BE49-F238E27FC236}">
-                <a16:creationId xmlns:a16="http://schemas.microsoft.com/office/drawing/2014/main" id="{CFB6CC72-2467-4AC5-846B-E3246BA7EB1D}"/>
-              </a:ext>
-            </a:extLst>
-          </p:cNvPr>
-          <p:cNvCxnSpPr>
-            <a:cxnSpLocks/>
-          </p:cNvCxnSpPr>
-          <p:nvPr/>
-        </p:nvCxnSpPr>
-        <p:spPr>
-          <a:xfrm flipH="1" flipV="1">
-            <a:off x="2518229" y="2119837"/>
-            <a:ext cx="1552389" cy="65311"/>
-          </a:xfrm>
-          <a:prstGeom prst="straightConnector1">
-            <a:avLst/>
-          </a:prstGeom>
-          <a:ln>
-            <a:solidFill>
-              <a:schemeClr val="bg2">
-                <a:lumMod val="10000"/>
-              </a:schemeClr>
-            </a:solidFill>
-            <a:tailEnd type="triangle"/>
-          </a:ln>
-          <a:effectLst/>
-        </p:spPr>
-        <p:style>
-          <a:lnRef idx="2">
-            <a:schemeClr val="accent1"/>
-          </a:lnRef>
-          <a:fillRef idx="0">
-            <a:schemeClr val="accent1"/>
-          </a:fillRef>
-          <a:effectRef idx="1">
-            <a:schemeClr val="accent1"/>
-          </a:effectRef>
-          <a:fontRef idx="minor">
-            <a:schemeClr val="tx1"/>
-          </a:fontRef>
-        </p:style>
-      </p:cxnSp>
-      <p:sp>
-        <p:nvSpPr>
-          <p:cNvPr id="12" name="TextBox 11">
-            <a:extLst>
-              <a:ext uri="{FF2B5EF4-FFF2-40B4-BE49-F238E27FC236}">
-                <a16:creationId xmlns:a16="http://schemas.microsoft.com/office/drawing/2014/main" id="{8F8A8A92-5241-4EE5-95BD-DB20B519931B}"/>
+                <a16:creationId xmlns:a16="http://schemas.microsoft.com/office/drawing/2014/main" id="{57954B00-FD3E-4791-8260-70B367A3DC18}"/>
               </a:ext>
             </a:extLst>
           </p:cNvPr>
@@ -4423,20 +4010,13 @@
         </p:nvSpPr>
         <p:spPr>
           <a:xfrm>
-            <a:off x="4128671" y="1510234"/>
-            <a:ext cx="1822185" cy="923330"/>
+            <a:off x="834571" y="61111"/>
+            <a:ext cx="7532915" cy="584775"/>
           </a:xfrm>
           <a:prstGeom prst="rect">
             <a:avLst/>
           </a:prstGeom>
           <a:noFill/>
-          <a:ln w="19050">
-            <a:solidFill>
-              <a:schemeClr val="bg2">
-                <a:lumMod val="10000"/>
-              </a:schemeClr>
-            </a:solidFill>
-          </a:ln>
         </p:spPr>
         <p:txBody>
           <a:bodyPr wrap="square" rtlCol="0">
@@ -4444,6 +4024,51 @@
           </a:bodyPr>
           <a:lstStyle/>
           <a:p>
+            <a:r>
+              <a:rPr lang="en-US" sz="3200" dirty="0">
+                <a:solidFill>
+                  <a:schemeClr val="bg2">
+                    <a:lumMod val="10000"/>
+                  </a:schemeClr>
+                </a:solidFill>
+              </a:rPr>
+              <a:t>To Install on personal laptop</a:t>
+            </a:r>
+          </a:p>
+        </p:txBody>
+      </p:sp>
+      <p:sp>
+        <p:nvSpPr>
+          <p:cNvPr id="5" name="TextBox 4">
+            <a:extLst>
+              <a:ext uri="{FF2B5EF4-FFF2-40B4-BE49-F238E27FC236}">
+                <a16:creationId xmlns:a16="http://schemas.microsoft.com/office/drawing/2014/main" id="{36BB773D-CB64-4393-85C1-E73C5A14E9C6}"/>
+              </a:ext>
+            </a:extLst>
+          </p:cNvPr>
+          <p:cNvSpPr txBox="1"/>
+          <p:nvPr/>
+        </p:nvSpPr>
+        <p:spPr>
+          <a:xfrm>
+            <a:off x="834570" y="812801"/>
+            <a:ext cx="7532915" cy="2862322"/>
+          </a:xfrm>
+          <a:prstGeom prst="rect">
+            <a:avLst/>
+          </a:prstGeom>
+          <a:noFill/>
+        </p:spPr>
+        <p:txBody>
+          <a:bodyPr wrap="square" rtlCol="0">
+            <a:spAutoFit/>
+          </a:bodyPr>
+          <a:lstStyle/>
+          <a:p>
+            <a:pPr marL="342900" indent="-342900">
+              <a:buFont typeface="+mj-lt"/>
+              <a:buAutoNum type="arabicPeriod"/>
+            </a:pPr>
             <a:r>
               <a:rPr lang="en-US" dirty="0">
                 <a:solidFill>
@@ -4452,56 +4077,168 @@
                   </a:schemeClr>
                 </a:solidFill>
               </a:rPr>
-              <a:t>Double click on this file to start the application</a:t>
+              <a:t>Save this file onto your computer in some location (for example, the desktop)</a:t>
             </a:r>
           </a:p>
-        </p:txBody>
-      </p:sp>
-      <p:sp>
-        <p:nvSpPr>
-          <p:cNvPr id="17" name="TextBox 16">
-            <a:extLst>
-              <a:ext uri="{FF2B5EF4-FFF2-40B4-BE49-F238E27FC236}">
-                <a16:creationId xmlns:a16="http://schemas.microsoft.com/office/drawing/2014/main" id="{99F18103-E1E8-423A-872D-48C146DA9404}"/>
-              </a:ext>
-            </a:extLst>
-          </p:cNvPr>
-          <p:cNvSpPr txBox="1"/>
-          <p:nvPr/>
-        </p:nvSpPr>
-        <p:spPr>
-          <a:xfrm>
-            <a:off x="928914" y="72571"/>
-            <a:ext cx="6553200" cy="584775"/>
-          </a:xfrm>
-          <a:prstGeom prst="rect">
-            <a:avLst/>
-          </a:prstGeom>
-          <a:noFill/>
-        </p:spPr>
-        <p:txBody>
-          <a:bodyPr wrap="square" rtlCol="0">
-            <a:spAutoFit/>
-          </a:bodyPr>
-          <a:lstStyle/>
-          <a:p>
+          <a:p>
+            <a:pPr marL="342900" indent="-342900">
+              <a:buFont typeface="+mj-lt"/>
+              <a:buAutoNum type="arabicPeriod"/>
+            </a:pPr>
+            <a:endParaRPr lang="en-US" dirty="0">
+              <a:solidFill>
+                <a:schemeClr val="bg2">
+                  <a:lumMod val="10000"/>
+                </a:schemeClr>
+              </a:solidFill>
+            </a:endParaRPr>
+          </a:p>
+          <a:p>
+            <a:pPr marL="342900" indent="-342900">
+              <a:buFont typeface="+mj-lt"/>
+              <a:buAutoNum type="arabicPeriod"/>
+            </a:pPr>
+            <a:endParaRPr lang="en-US" dirty="0">
+              <a:solidFill>
+                <a:schemeClr val="bg2">
+                  <a:lumMod val="10000"/>
+                </a:schemeClr>
+              </a:solidFill>
+            </a:endParaRPr>
+          </a:p>
+          <a:p>
+            <a:pPr marL="342900" indent="-342900">
+              <a:buFont typeface="+mj-lt"/>
+              <a:buAutoNum type="arabicPeriod"/>
+            </a:pPr>
             <a:r>
-              <a:rPr lang="en-US" sz="3200" dirty="0">
+              <a:rPr lang="en-US" dirty="0">
                 <a:solidFill>
                   <a:schemeClr val="bg2">
                     <a:lumMod val="10000"/>
                   </a:schemeClr>
                 </a:solidFill>
               </a:rPr>
-              <a:t>On Test Stands (already installed)</a:t>
+              <a:t>Open a command line in the location you saved the file</a:t>
+            </a:r>
+          </a:p>
+          <a:p>
+            <a:pPr marL="800100" lvl="1" indent="-342900">
+              <a:buFont typeface="Arial" panose="020B0604020202020204" pitchFamily="34" charset="0"/>
+              <a:buChar char="•"/>
+            </a:pPr>
+            <a:r>
+              <a:rPr lang="en-US" dirty="0">
+                <a:solidFill>
+                  <a:schemeClr val="bg2">
+                    <a:lumMod val="10000"/>
+                  </a:schemeClr>
+                </a:solidFill>
+              </a:rPr>
+              <a:t>This can be done by holding down the shift key and right-clicking, then choose “Open PowerShell window here”</a:t>
+            </a:r>
+          </a:p>
+          <a:p>
+            <a:pPr marL="342900" indent="-342900">
+              <a:buFont typeface="+mj-lt"/>
+              <a:buAutoNum type="arabicPeriod"/>
+            </a:pPr>
+            <a:r>
+              <a:rPr lang="en-US" dirty="0">
+                <a:solidFill>
+                  <a:schemeClr val="bg2">
+                    <a:lumMod val="10000"/>
+                  </a:schemeClr>
+                </a:solidFill>
+              </a:rPr>
+              <a:t>Type in this command: python –m pip install dataplotter-1.0.2.tar.gz</a:t>
+            </a:r>
+          </a:p>
+          <a:p>
+            <a:pPr marL="342900" indent="-342900">
+              <a:buFont typeface="+mj-lt"/>
+              <a:buAutoNum type="arabicPeriod"/>
+            </a:pPr>
+            <a:r>
+              <a:rPr lang="en-US" dirty="0">
+                <a:solidFill>
+                  <a:schemeClr val="bg2">
+                    <a:lumMod val="10000"/>
+                  </a:schemeClr>
+                </a:solidFill>
+              </a:rPr>
+              <a:t>This will automatically create the icon shown in the slide above, so simply double click on the icon to open the application</a:t>
             </a:r>
           </a:p>
         </p:txBody>
       </p:sp>
+      <p:graphicFrame>
+        <p:nvGraphicFramePr>
+          <p:cNvPr id="2" name="Object 1">
+            <a:extLst>
+              <a:ext uri="{FF2B5EF4-FFF2-40B4-BE49-F238E27FC236}">
+                <a16:creationId xmlns:a16="http://schemas.microsoft.com/office/drawing/2014/main" id="{0092661B-36EE-40D1-BA18-BC55E02F18EF}"/>
+              </a:ext>
+            </a:extLst>
+          </p:cNvPr>
+          <p:cNvGraphicFramePr>
+            <a:graphicFrameLocks noChangeAspect="1"/>
+          </p:cNvGraphicFramePr>
+          <p:nvPr>
+            <p:extLst>
+              <p:ext uri="{D42A27DB-BD31-4B8C-83A1-F6EECF244321}">
+                <p14:modId xmlns:p14="http://schemas.microsoft.com/office/powerpoint/2010/main" val="3226324289"/>
+              </p:ext>
+            </p:extLst>
+          </p:nvPr>
+        </p:nvGraphicFramePr>
+        <p:xfrm>
+          <a:off x="3805238" y="1369105"/>
+          <a:ext cx="1314450" cy="479425"/>
+        </p:xfrm>
+        <a:graphic>
+          <a:graphicData uri="http://schemas.openxmlformats.org/presentationml/2006/ole">
+            <mc:AlternateContent xmlns:mc="http://schemas.openxmlformats.org/markup-compatibility/2006">
+              <mc:Choice xmlns:v="urn:schemas-microsoft-com:vml" Requires="v">
+                <p:oleObj spid="_x0000_s1087" name="Packager Shell Object" showAsIcon="1" r:id="rId3" imgW="1315080" imgH="478800" progId="Package">
+                  <p:embed/>
+                </p:oleObj>
+              </mc:Choice>
+              <mc:Fallback>
+                <p:oleObj name="Packager Shell Object" showAsIcon="1" r:id="rId3" imgW="1315080" imgH="478800" progId="Package">
+                  <p:embed/>
+                  <p:pic>
+                    <p:nvPicPr>
+                      <p:cNvPr id="0" name=""/>
+                      <p:cNvPicPr/>
+                      <p:nvPr/>
+                    </p:nvPicPr>
+                    <p:blipFill>
+                      <a:blip r:embed="rId4"/>
+                      <a:stretch>
+                        <a:fillRect/>
+                      </a:stretch>
+                    </p:blipFill>
+                    <p:spPr>
+                      <a:xfrm>
+                        <a:off x="3805238" y="1369105"/>
+                        <a:ext cx="1314450" cy="479425"/>
+                      </a:xfrm>
+                      <a:prstGeom prst="rect">
+                        <a:avLst/>
+                      </a:prstGeom>
+                    </p:spPr>
+                  </p:pic>
+                </p:oleObj>
+              </mc:Fallback>
+            </mc:AlternateContent>
+          </a:graphicData>
+        </a:graphic>
+      </p:graphicFrame>
     </p:spTree>
     <p:extLst>
       <p:ext uri="{BB962C8B-B14F-4D97-AF65-F5344CB8AC3E}">
-        <p14:creationId xmlns:p14="http://schemas.microsoft.com/office/powerpoint/2010/main" val="3911897736"/>
+        <p14:creationId xmlns:p14="http://schemas.microsoft.com/office/powerpoint/2010/main" val="4246224612"/>
       </p:ext>
     </p:extLst>
   </p:cSld>
@@ -4581,12 +4318,42 @@
           </a:p>
         </p:txBody>
       </p:sp>
+      <p:pic>
+        <p:nvPicPr>
+          <p:cNvPr id="2" name="Picture 1">
+            <a:extLst>
+              <a:ext uri="{FF2B5EF4-FFF2-40B4-BE49-F238E27FC236}">
+                <a16:creationId xmlns:a16="http://schemas.microsoft.com/office/drawing/2014/main" id="{3B6A22BD-6DED-48DE-AE0B-4AB67FF58358}"/>
+              </a:ext>
+            </a:extLst>
+          </p:cNvPr>
+          <p:cNvPicPr>
+            <a:picLocks noChangeAspect="1"/>
+          </p:cNvPicPr>
+          <p:nvPr/>
+        </p:nvPicPr>
+        <p:blipFill>
+          <a:blip r:embed="rId2"/>
+          <a:stretch>
+            <a:fillRect/>
+          </a:stretch>
+        </p:blipFill>
+        <p:spPr>
+          <a:xfrm>
+            <a:off x="1311835" y="899886"/>
+            <a:ext cx="6520329" cy="3463925"/>
+          </a:xfrm>
+          <a:prstGeom prst="rect">
+            <a:avLst/>
+          </a:prstGeom>
+        </p:spPr>
+      </p:pic>
       <p:sp>
         <p:nvSpPr>
-          <p:cNvPr id="3" name="TextBox 2">
+          <p:cNvPr id="5" name="TextBox 4">
             <a:extLst>
               <a:ext uri="{FF2B5EF4-FFF2-40B4-BE49-F238E27FC236}">
-                <a16:creationId xmlns:a16="http://schemas.microsoft.com/office/drawing/2014/main" id="{57954B00-FD3E-4791-8260-70B367A3DC18}"/>
+                <a16:creationId xmlns:a16="http://schemas.microsoft.com/office/drawing/2014/main" id="{74E5202A-004F-42F8-B491-5142C962E18A}"/>
               </a:ext>
             </a:extLst>
           </p:cNvPr>
@@ -4595,7 +4362,7 @@
         </p:nvSpPr>
         <p:spPr>
           <a:xfrm>
-            <a:off x="834571" y="61111"/>
+            <a:off x="805541" y="61111"/>
             <a:ext cx="7532915" cy="584775"/>
           </a:xfrm>
           <a:prstGeom prst="rect">
@@ -4617,213 +4384,15 @@
                   </a:schemeClr>
                 </a:solidFill>
               </a:rPr>
-              <a:t>To Install on personal laptop</a:t>
+              <a:t>This is what the application looks like</a:t>
             </a:r>
           </a:p>
         </p:txBody>
       </p:sp>
-      <p:sp>
-        <p:nvSpPr>
-          <p:cNvPr id="5" name="TextBox 4">
-            <a:extLst>
-              <a:ext uri="{FF2B5EF4-FFF2-40B4-BE49-F238E27FC236}">
-                <a16:creationId xmlns:a16="http://schemas.microsoft.com/office/drawing/2014/main" id="{36BB773D-CB64-4393-85C1-E73C5A14E9C6}"/>
-              </a:ext>
-            </a:extLst>
-          </p:cNvPr>
-          <p:cNvSpPr txBox="1"/>
-          <p:nvPr/>
-        </p:nvSpPr>
-        <p:spPr>
-          <a:xfrm>
-            <a:off x="834570" y="812801"/>
-            <a:ext cx="7532915" cy="2862322"/>
-          </a:xfrm>
-          <a:prstGeom prst="rect">
-            <a:avLst/>
-          </a:prstGeom>
-          <a:noFill/>
-        </p:spPr>
-        <p:txBody>
-          <a:bodyPr wrap="square" rtlCol="0">
-            <a:spAutoFit/>
-          </a:bodyPr>
-          <a:lstStyle/>
-          <a:p>
-            <a:pPr marL="342900" indent="-342900">
-              <a:buFont typeface="+mj-lt"/>
-              <a:buAutoNum type="arabicPeriod"/>
-            </a:pPr>
-            <a:r>
-              <a:rPr lang="en-US" dirty="0">
-                <a:solidFill>
-                  <a:schemeClr val="bg2">
-                    <a:lumMod val="10000"/>
-                  </a:schemeClr>
-                </a:solidFill>
-              </a:rPr>
-              <a:t>Save this file onto your computer in some location (for example, the desktop)</a:t>
-            </a:r>
-          </a:p>
-          <a:p>
-            <a:pPr marL="342900" indent="-342900">
-              <a:buFont typeface="+mj-lt"/>
-              <a:buAutoNum type="arabicPeriod"/>
-            </a:pPr>
-            <a:endParaRPr lang="en-US" dirty="0">
-              <a:solidFill>
-                <a:schemeClr val="bg2">
-                  <a:lumMod val="10000"/>
-                </a:schemeClr>
-              </a:solidFill>
-            </a:endParaRPr>
-          </a:p>
-          <a:p>
-            <a:pPr marL="342900" indent="-342900">
-              <a:buFont typeface="+mj-lt"/>
-              <a:buAutoNum type="arabicPeriod"/>
-            </a:pPr>
-            <a:endParaRPr lang="en-US" dirty="0">
-              <a:solidFill>
-                <a:schemeClr val="bg2">
-                  <a:lumMod val="10000"/>
-                </a:schemeClr>
-              </a:solidFill>
-            </a:endParaRPr>
-          </a:p>
-          <a:p>
-            <a:pPr marL="342900" indent="-342900">
-              <a:buFont typeface="+mj-lt"/>
-              <a:buAutoNum type="arabicPeriod"/>
-            </a:pPr>
-            <a:r>
-              <a:rPr lang="en-US" dirty="0">
-                <a:solidFill>
-                  <a:schemeClr val="bg2">
-                    <a:lumMod val="10000"/>
-                  </a:schemeClr>
-                </a:solidFill>
-              </a:rPr>
-              <a:t>Open a command line in the location you saved the file</a:t>
-            </a:r>
-          </a:p>
-          <a:p>
-            <a:pPr marL="800100" lvl="1" indent="-342900">
-              <a:buFont typeface="Arial" panose="020B0604020202020204" pitchFamily="34" charset="0"/>
-              <a:buChar char="•"/>
-            </a:pPr>
-            <a:r>
-              <a:rPr lang="en-US" dirty="0">
-                <a:solidFill>
-                  <a:schemeClr val="bg2">
-                    <a:lumMod val="10000"/>
-                  </a:schemeClr>
-                </a:solidFill>
-              </a:rPr>
-              <a:t>This can be done by holding down the shift key and right-clicking, then choose “Open PowerShell window here”</a:t>
-            </a:r>
-          </a:p>
-          <a:p>
-            <a:pPr marL="342900" indent="-342900">
-              <a:buFont typeface="+mj-lt"/>
-              <a:buAutoNum type="arabicPeriod"/>
-            </a:pPr>
-            <a:r>
-              <a:rPr lang="en-US" dirty="0">
-                <a:solidFill>
-                  <a:schemeClr val="bg2">
-                    <a:lumMod val="10000"/>
-                  </a:schemeClr>
-                </a:solidFill>
-              </a:rPr>
-              <a:t>Type in this command: python –m pip install dataplotter-1.0.1.tar.gz</a:t>
-            </a:r>
-          </a:p>
-          <a:p>
-            <a:pPr marL="342900" indent="-342900">
-              <a:buFont typeface="+mj-lt"/>
-              <a:buAutoNum type="arabicPeriod"/>
-            </a:pPr>
-            <a:r>
-              <a:rPr lang="en-US" dirty="0">
-                <a:solidFill>
-                  <a:schemeClr val="bg2">
-                    <a:lumMod val="10000"/>
-                  </a:schemeClr>
-                </a:solidFill>
-              </a:rPr>
-              <a:t>This will automatically create the icon shown in the slide above, so simply double click on the icon to open the application</a:t>
-            </a:r>
-          </a:p>
-        </p:txBody>
-      </p:sp>
-      <p:graphicFrame>
-        <p:nvGraphicFramePr>
-          <p:cNvPr id="6" name="Object 5">
-            <a:extLst>
-              <a:ext uri="{FF2B5EF4-FFF2-40B4-BE49-F238E27FC236}">
-                <a16:creationId xmlns:a16="http://schemas.microsoft.com/office/drawing/2014/main" id="{13E5C0C4-EF78-4547-9FD6-DEA1C0B90EC5}"/>
-              </a:ext>
-            </a:extLst>
-          </p:cNvPr>
-          <p:cNvGraphicFramePr>
-            <a:graphicFrameLocks noChangeAspect="1"/>
-          </p:cNvGraphicFramePr>
-          <p:nvPr>
-            <p:extLst>
-              <p:ext uri="{D42A27DB-BD31-4B8C-83A1-F6EECF244321}">
-                <p14:modId xmlns:p14="http://schemas.microsoft.com/office/powerpoint/2010/main" val="1816760750"/>
-              </p:ext>
-            </p:extLst>
-          </p:nvPr>
-        </p:nvGraphicFramePr>
-        <p:xfrm>
-          <a:off x="3943802" y="1369105"/>
-          <a:ext cx="1314450" cy="479425"/>
-        </p:xfrm>
-        <a:graphic>
-          <a:graphicData uri="http://schemas.openxmlformats.org/presentationml/2006/ole">
-            <mc:AlternateContent xmlns:mc="http://schemas.openxmlformats.org/markup-compatibility/2006">
-              <mc:Choice xmlns:v="urn:schemas-microsoft-com:vml" Requires="v">
-                <p:oleObj spid="_x0000_s1081" name="Packager Shell Object" showAsIcon="1" r:id="rId3" imgW="1315080" imgH="478800" progId="Package">
-                  <p:embed/>
-                </p:oleObj>
-              </mc:Choice>
-              <mc:Fallback>
-                <p:oleObj name="Packager Shell Object" showAsIcon="1" r:id="rId3" imgW="1315080" imgH="478800" progId="Package">
-                  <p:embed/>
-                  <p:pic>
-                    <p:nvPicPr>
-                      <p:cNvPr id="0" name=""/>
-                      <p:cNvPicPr/>
-                      <p:nvPr/>
-                    </p:nvPicPr>
-                    <p:blipFill>
-                      <a:blip r:embed="rId4"/>
-                      <a:stretch>
-                        <a:fillRect/>
-                      </a:stretch>
-                    </p:blipFill>
-                    <p:spPr>
-                      <a:xfrm>
-                        <a:off x="3943802" y="1369105"/>
-                        <a:ext cx="1314450" cy="479425"/>
-                      </a:xfrm>
-                      <a:prstGeom prst="rect">
-                        <a:avLst/>
-                      </a:prstGeom>
-                    </p:spPr>
-                  </p:pic>
-                </p:oleObj>
-              </mc:Fallback>
-            </mc:AlternateContent>
-          </a:graphicData>
-        </a:graphic>
-      </p:graphicFrame>
     </p:spTree>
     <p:extLst>
       <p:ext uri="{BB962C8B-B14F-4D97-AF65-F5344CB8AC3E}">
-        <p14:creationId xmlns:p14="http://schemas.microsoft.com/office/powerpoint/2010/main" val="4246224612"/>
+        <p14:creationId xmlns:p14="http://schemas.microsoft.com/office/powerpoint/2010/main" val="3028805181"/>
       </p:ext>
     </p:extLst>
   </p:cSld>
@@ -4905,10 +4474,10 @@
       </p:sp>
       <p:pic>
         <p:nvPicPr>
-          <p:cNvPr id="2" name="Picture 1">
+          <p:cNvPr id="3" name="Picture 2">
             <a:extLst>
               <a:ext uri="{FF2B5EF4-FFF2-40B4-BE49-F238E27FC236}">
-                <a16:creationId xmlns:a16="http://schemas.microsoft.com/office/drawing/2014/main" id="{3B6A22BD-6DED-48DE-AE0B-4AB67FF58358}"/>
+                <a16:creationId xmlns:a16="http://schemas.microsoft.com/office/drawing/2014/main" id="{7B03E0AA-85D7-4024-8653-2B6B86E05C6E}"/>
               </a:ext>
             </a:extLst>
           </p:cNvPr>
@@ -4917,16 +4486,15 @@
           </p:cNvPicPr>
           <p:nvPr/>
         </p:nvPicPr>
-        <p:blipFill>
+        <p:blipFill rotWithShape="1">
           <a:blip r:embed="rId2"/>
-          <a:stretch>
-            <a:fillRect/>
-          </a:stretch>
+          <a:srcRect l="904" t="1439" r="1026" b="1656"/>
+          <a:stretch/>
         </p:blipFill>
         <p:spPr>
           <a:xfrm>
-            <a:off x="1311835" y="899886"/>
-            <a:ext cx="6520329" cy="3463925"/>
+            <a:off x="1618343" y="232229"/>
+            <a:ext cx="5900057" cy="4051006"/>
           </a:xfrm>
           <a:prstGeom prst="rect">
             <a:avLst/>
@@ -4935,10 +4503,61 @@
       </p:pic>
       <p:sp>
         <p:nvSpPr>
-          <p:cNvPr id="5" name="TextBox 4">
+          <p:cNvPr id="5" name="Rectangle 4">
             <a:extLst>
               <a:ext uri="{FF2B5EF4-FFF2-40B4-BE49-F238E27FC236}">
-                <a16:creationId xmlns:a16="http://schemas.microsoft.com/office/drawing/2014/main" id="{74E5202A-004F-42F8-B491-5142C962E18A}"/>
+                <a16:creationId xmlns:a16="http://schemas.microsoft.com/office/drawing/2014/main" id="{C90037FC-376B-4B9E-8D3A-CA287B00F0A1}"/>
+              </a:ext>
+            </a:extLst>
+          </p:cNvPr>
+          <p:cNvSpPr/>
+          <p:nvPr/>
+        </p:nvSpPr>
+        <p:spPr>
+          <a:xfrm>
+            <a:off x="6284685" y="860265"/>
+            <a:ext cx="769257" cy="410323"/>
+          </a:xfrm>
+          <a:prstGeom prst="rect">
+            <a:avLst/>
+          </a:prstGeom>
+          <a:noFill/>
+          <a:ln w="19050">
+            <a:solidFill>
+              <a:srgbClr val="FF0000"/>
+            </a:solidFill>
+          </a:ln>
+          <a:effectLst/>
+        </p:spPr>
+        <p:style>
+          <a:lnRef idx="1">
+            <a:schemeClr val="accent1"/>
+          </a:lnRef>
+          <a:fillRef idx="3">
+            <a:schemeClr val="accent1"/>
+          </a:fillRef>
+          <a:effectRef idx="2">
+            <a:schemeClr val="accent1"/>
+          </a:effectRef>
+          <a:fontRef idx="minor">
+            <a:schemeClr val="lt1"/>
+          </a:fontRef>
+        </p:style>
+        <p:txBody>
+          <a:bodyPr rtlCol="0" anchor="ctr"/>
+          <a:lstStyle/>
+          <a:p>
+            <a:pPr algn="ctr"/>
+            <a:endParaRPr lang="en-US"/>
+          </a:p>
+        </p:txBody>
+      </p:sp>
+      <p:sp>
+        <p:nvSpPr>
+          <p:cNvPr id="6" name="TextBox 5">
+            <a:extLst>
+              <a:ext uri="{FF2B5EF4-FFF2-40B4-BE49-F238E27FC236}">
+                <a16:creationId xmlns:a16="http://schemas.microsoft.com/office/drawing/2014/main" id="{109AB07D-603F-4DA0-925E-FC3623AD4611}"/>
               </a:ext>
             </a:extLst>
           </p:cNvPr>
@@ -4947,13 +4566,20 @@
         </p:nvSpPr>
         <p:spPr>
           <a:xfrm>
-            <a:off x="805541" y="61111"/>
-            <a:ext cx="7532915" cy="584775"/>
+            <a:off x="7192695" y="1447807"/>
+            <a:ext cx="1822185" cy="923330"/>
           </a:xfrm>
           <a:prstGeom prst="rect">
             <a:avLst/>
           </a:prstGeom>
           <a:noFill/>
+          <a:ln w="19050">
+            <a:solidFill>
+              <a:schemeClr val="bg2">
+                <a:lumMod val="10000"/>
+              </a:schemeClr>
+            </a:solidFill>
+          </a:ln>
         </p:spPr>
         <p:txBody>
           <a:bodyPr wrap="square" rtlCol="0">
@@ -4962,22 +4588,69 @@
           <a:lstStyle/>
           <a:p>
             <a:r>
-              <a:rPr lang="en-US" sz="3200" dirty="0">
+              <a:rPr lang="en-US" dirty="0">
                 <a:solidFill>
                   <a:schemeClr val="bg2">
                     <a:lumMod val="10000"/>
                   </a:schemeClr>
                 </a:solidFill>
               </a:rPr>
-              <a:t>This is what the application looks like</a:t>
+              <a:t>Click this button to select the desired files</a:t>
             </a:r>
           </a:p>
         </p:txBody>
       </p:sp>
+      <p:cxnSp>
+        <p:nvCxnSpPr>
+          <p:cNvPr id="7" name="Straight Arrow Connector 6">
+            <a:extLst>
+              <a:ext uri="{FF2B5EF4-FFF2-40B4-BE49-F238E27FC236}">
+                <a16:creationId xmlns:a16="http://schemas.microsoft.com/office/drawing/2014/main" id="{741E155C-9270-4FE7-AB16-D62C62A04475}"/>
+              </a:ext>
+            </a:extLst>
+          </p:cNvPr>
+          <p:cNvCxnSpPr>
+            <a:cxnSpLocks/>
+          </p:cNvCxnSpPr>
+          <p:nvPr/>
+        </p:nvCxnSpPr>
+        <p:spPr>
+          <a:xfrm flipH="1" flipV="1">
+            <a:off x="7104744" y="1065427"/>
+            <a:ext cx="798285" cy="313430"/>
+          </a:xfrm>
+          <a:prstGeom prst="straightConnector1">
+            <a:avLst/>
+          </a:prstGeom>
+          <a:ln>
+            <a:solidFill>
+              <a:schemeClr val="bg2">
+                <a:lumMod val="10000"/>
+              </a:schemeClr>
+            </a:solidFill>
+            <a:tailEnd type="triangle"/>
+          </a:ln>
+          <a:effectLst/>
+        </p:spPr>
+        <p:style>
+          <a:lnRef idx="2">
+            <a:schemeClr val="accent1"/>
+          </a:lnRef>
+          <a:fillRef idx="0">
+            <a:schemeClr val="accent1"/>
+          </a:fillRef>
+          <a:effectRef idx="1">
+            <a:schemeClr val="accent1"/>
+          </a:effectRef>
+          <a:fontRef idx="minor">
+            <a:schemeClr val="tx1"/>
+          </a:fontRef>
+        </p:style>
+      </p:cxnSp>
     </p:spTree>
     <p:extLst>
       <p:ext uri="{BB962C8B-B14F-4D97-AF65-F5344CB8AC3E}">
-        <p14:creationId xmlns:p14="http://schemas.microsoft.com/office/powerpoint/2010/main" val="3028805181"/>
+        <p14:creationId xmlns:p14="http://schemas.microsoft.com/office/powerpoint/2010/main" val="4239386870"/>
       </p:ext>
     </p:extLst>
   </p:cSld>
@@ -5059,10 +4732,10 @@
       </p:sp>
       <p:pic>
         <p:nvPicPr>
-          <p:cNvPr id="3" name="Picture 2">
+          <p:cNvPr id="2" name="Picture 1">
             <a:extLst>
               <a:ext uri="{FF2B5EF4-FFF2-40B4-BE49-F238E27FC236}">
-                <a16:creationId xmlns:a16="http://schemas.microsoft.com/office/drawing/2014/main" id="{7B03E0AA-85D7-4024-8653-2B6B86E05C6E}"/>
+                <a16:creationId xmlns:a16="http://schemas.microsoft.com/office/drawing/2014/main" id="{62EBBEC4-DC39-48E1-B6F7-A6FD13795495}"/>
               </a:ext>
             </a:extLst>
           </p:cNvPr>
@@ -5073,13 +4746,13 @@
         </p:nvPicPr>
         <p:blipFill rotWithShape="1">
           <a:blip r:embed="rId2"/>
-          <a:srcRect l="904" t="1439" r="1026" b="1656"/>
+          <a:srcRect l="1340" t="1449" r="1195"/>
           <a:stretch/>
         </p:blipFill>
         <p:spPr>
           <a:xfrm>
-            <a:off x="1618343" y="232229"/>
-            <a:ext cx="5900057" cy="4051006"/>
+            <a:off x="2173514" y="592880"/>
+            <a:ext cx="4796971" cy="3759589"/>
           </a:xfrm>
           <a:prstGeom prst="rect">
             <a:avLst/>
@@ -5088,61 +4761,10 @@
       </p:pic>
       <p:sp>
         <p:nvSpPr>
-          <p:cNvPr id="5" name="Rectangle 4">
+          <p:cNvPr id="5" name="TextBox 4">
             <a:extLst>
               <a:ext uri="{FF2B5EF4-FFF2-40B4-BE49-F238E27FC236}">
-                <a16:creationId xmlns:a16="http://schemas.microsoft.com/office/drawing/2014/main" id="{C90037FC-376B-4B9E-8D3A-CA287B00F0A1}"/>
-              </a:ext>
-            </a:extLst>
-          </p:cNvPr>
-          <p:cNvSpPr/>
-          <p:nvPr/>
-        </p:nvSpPr>
-        <p:spPr>
-          <a:xfrm>
-            <a:off x="6284685" y="860265"/>
-            <a:ext cx="769257" cy="410323"/>
-          </a:xfrm>
-          <a:prstGeom prst="rect">
-            <a:avLst/>
-          </a:prstGeom>
-          <a:noFill/>
-          <a:ln w="19050">
-            <a:solidFill>
-              <a:srgbClr val="FF0000"/>
-            </a:solidFill>
-          </a:ln>
-          <a:effectLst/>
-        </p:spPr>
-        <p:style>
-          <a:lnRef idx="1">
-            <a:schemeClr val="accent1"/>
-          </a:lnRef>
-          <a:fillRef idx="3">
-            <a:schemeClr val="accent1"/>
-          </a:fillRef>
-          <a:effectRef idx="2">
-            <a:schemeClr val="accent1"/>
-          </a:effectRef>
-          <a:fontRef idx="minor">
-            <a:schemeClr val="lt1"/>
-          </a:fontRef>
-        </p:style>
-        <p:txBody>
-          <a:bodyPr rtlCol="0" anchor="ctr"/>
-          <a:lstStyle/>
-          <a:p>
-            <a:pPr algn="ctr"/>
-            <a:endParaRPr lang="en-US"/>
-          </a:p>
-        </p:txBody>
-      </p:sp>
-      <p:sp>
-        <p:nvSpPr>
-          <p:cNvPr id="6" name="TextBox 5">
-            <a:extLst>
-              <a:ext uri="{FF2B5EF4-FFF2-40B4-BE49-F238E27FC236}">
-                <a16:creationId xmlns:a16="http://schemas.microsoft.com/office/drawing/2014/main" id="{109AB07D-603F-4DA0-925E-FC3623AD4611}"/>
+                <a16:creationId xmlns:a16="http://schemas.microsoft.com/office/drawing/2014/main" id="{47542758-3259-4965-A3FD-A65844097FCA}"/>
               </a:ext>
             </a:extLst>
           </p:cNvPr>
@@ -5151,20 +4773,13 @@
         </p:nvSpPr>
         <p:spPr>
           <a:xfrm>
-            <a:off x="7192695" y="1447807"/>
-            <a:ext cx="1822185" cy="923330"/>
+            <a:off x="805541" y="61111"/>
+            <a:ext cx="7532915" cy="584775"/>
           </a:xfrm>
           <a:prstGeom prst="rect">
             <a:avLst/>
           </a:prstGeom>
           <a:noFill/>
-          <a:ln w="19050">
-            <a:solidFill>
-              <a:schemeClr val="bg2">
-                <a:lumMod val="10000"/>
-              </a:schemeClr>
-            </a:solidFill>
-          </a:ln>
         </p:spPr>
         <p:txBody>
           <a:bodyPr wrap="square" rtlCol="0">
@@ -5173,69 +4788,22 @@
           <a:lstStyle/>
           <a:p>
             <a:r>
-              <a:rPr lang="en-US" dirty="0">
+              <a:rPr lang="en-US" sz="3200" dirty="0">
                 <a:solidFill>
                   <a:schemeClr val="bg2">
                     <a:lumMod val="10000"/>
                   </a:schemeClr>
                 </a:solidFill>
               </a:rPr>
-              <a:t>Click this button to select the desired files</a:t>
+              <a:t>This File Explorer tab will pop up</a:t>
             </a:r>
           </a:p>
         </p:txBody>
       </p:sp>
-      <p:cxnSp>
-        <p:nvCxnSpPr>
-          <p:cNvPr id="7" name="Straight Arrow Connector 6">
-            <a:extLst>
-              <a:ext uri="{FF2B5EF4-FFF2-40B4-BE49-F238E27FC236}">
-                <a16:creationId xmlns:a16="http://schemas.microsoft.com/office/drawing/2014/main" id="{741E155C-9270-4FE7-AB16-D62C62A04475}"/>
-              </a:ext>
-            </a:extLst>
-          </p:cNvPr>
-          <p:cNvCxnSpPr>
-            <a:cxnSpLocks/>
-          </p:cNvCxnSpPr>
-          <p:nvPr/>
-        </p:nvCxnSpPr>
-        <p:spPr>
-          <a:xfrm flipH="1" flipV="1">
-            <a:off x="7104744" y="1065427"/>
-            <a:ext cx="798285" cy="313430"/>
-          </a:xfrm>
-          <a:prstGeom prst="straightConnector1">
-            <a:avLst/>
-          </a:prstGeom>
-          <a:ln>
-            <a:solidFill>
-              <a:schemeClr val="bg2">
-                <a:lumMod val="10000"/>
-              </a:schemeClr>
-            </a:solidFill>
-            <a:tailEnd type="triangle"/>
-          </a:ln>
-          <a:effectLst/>
-        </p:spPr>
-        <p:style>
-          <a:lnRef idx="2">
-            <a:schemeClr val="accent1"/>
-          </a:lnRef>
-          <a:fillRef idx="0">
-            <a:schemeClr val="accent1"/>
-          </a:fillRef>
-          <a:effectRef idx="1">
-            <a:schemeClr val="accent1"/>
-          </a:effectRef>
-          <a:fontRef idx="minor">
-            <a:schemeClr val="tx1"/>
-          </a:fontRef>
-        </p:style>
-      </p:cxnSp>
     </p:spTree>
     <p:extLst>
       <p:ext uri="{BB962C8B-B14F-4D97-AF65-F5344CB8AC3E}">
-        <p14:creationId xmlns:p14="http://schemas.microsoft.com/office/powerpoint/2010/main" val="4239386870"/>
+        <p14:creationId xmlns:p14="http://schemas.microsoft.com/office/powerpoint/2010/main" val="1723893334"/>
       </p:ext>
     </p:extLst>
   </p:cSld>
@@ -5315,12 +4883,107 @@
           </a:p>
         </p:txBody>
       </p:sp>
+      <p:sp>
+        <p:nvSpPr>
+          <p:cNvPr id="5" name="TextBox 4">
+            <a:extLst>
+              <a:ext uri="{FF2B5EF4-FFF2-40B4-BE49-F238E27FC236}">
+                <a16:creationId xmlns:a16="http://schemas.microsoft.com/office/drawing/2014/main" id="{47542758-3259-4965-A3FD-A65844097FCA}"/>
+              </a:ext>
+            </a:extLst>
+          </p:cNvPr>
+          <p:cNvSpPr txBox="1"/>
+          <p:nvPr/>
+        </p:nvSpPr>
+        <p:spPr>
+          <a:xfrm>
+            <a:off x="210603" y="312057"/>
+            <a:ext cx="3635683" cy="3785652"/>
+          </a:xfrm>
+          <a:prstGeom prst="rect">
+            <a:avLst/>
+          </a:prstGeom>
+          <a:noFill/>
+        </p:spPr>
+        <p:txBody>
+          <a:bodyPr wrap="square" rtlCol="0">
+            <a:spAutoFit/>
+          </a:bodyPr>
+          <a:lstStyle/>
+          <a:p>
+            <a:pPr marL="457200" indent="-457200">
+              <a:buFont typeface="Arial" panose="020B0604020202020204" pitchFamily="34" charset="0"/>
+              <a:buChar char="•"/>
+            </a:pPr>
+            <a:r>
+              <a:rPr lang="en-US" sz="2000" dirty="0">
+                <a:solidFill>
+                  <a:schemeClr val="bg2">
+                    <a:lumMod val="10000"/>
+                  </a:schemeClr>
+                </a:solidFill>
+              </a:rPr>
+              <a:t>Navigate to the files you would like to select</a:t>
+            </a:r>
+          </a:p>
+          <a:p>
+            <a:endParaRPr lang="en-US" sz="2000" dirty="0">
+              <a:solidFill>
+                <a:schemeClr val="bg2">
+                  <a:lumMod val="10000"/>
+                </a:schemeClr>
+              </a:solidFill>
+            </a:endParaRPr>
+          </a:p>
+          <a:p>
+            <a:pPr marL="457200" indent="-457200">
+              <a:buFont typeface="Arial" panose="020B0604020202020204" pitchFamily="34" charset="0"/>
+              <a:buChar char="•"/>
+            </a:pPr>
+            <a:r>
+              <a:rPr lang="en-US" sz="2000" dirty="0">
+                <a:solidFill>
+                  <a:schemeClr val="bg2">
+                    <a:lumMod val="10000"/>
+                  </a:schemeClr>
+                </a:solidFill>
+              </a:rPr>
+              <a:t>Select the files by holding down the control button and clicking them. They will automatically be highlighted in blue when selected</a:t>
+            </a:r>
+          </a:p>
+          <a:p>
+            <a:endParaRPr lang="en-US" sz="2000" dirty="0">
+              <a:solidFill>
+                <a:schemeClr val="bg2">
+                  <a:lumMod val="10000"/>
+                </a:schemeClr>
+              </a:solidFill>
+            </a:endParaRPr>
+          </a:p>
+          <a:p>
+            <a:pPr marL="457200" indent="-457200">
+              <a:buFont typeface="Arial" panose="020B0604020202020204" pitchFamily="34" charset="0"/>
+              <a:buChar char="•"/>
+            </a:pPr>
+            <a:r>
+              <a:rPr lang="en-US" sz="2000" dirty="0">
+                <a:solidFill>
+                  <a:schemeClr val="bg2">
+                    <a:lumMod val="10000"/>
+                  </a:schemeClr>
+                </a:solidFill>
+              </a:rPr>
+              <a:t>Press “Open” button when done</a:t>
+            </a:r>
+          </a:p>
+        </p:txBody>
+      </p:sp>
       <p:pic>
         <p:nvPicPr>
-          <p:cNvPr id="2" name="Picture 1">
+          <p:cNvPr id="3" name="Picture 2">
             <a:extLst>
               <a:ext uri="{FF2B5EF4-FFF2-40B4-BE49-F238E27FC236}">
-                <a16:creationId xmlns:a16="http://schemas.microsoft.com/office/drawing/2014/main" id="{62EBBEC4-DC39-48E1-B6F7-A6FD13795495}"/>
+                <a16:creationId xmlns:a16="http://schemas.microsoft.com/office/drawing/2014/main" id="{14209CE8-14E9-448B-BCC8-179D4FBE664E}"/>
               </a:ext>
             </a:extLst>
           </p:cNvPr>
@@ -5331,13 +4994,13 @@
         </p:nvPicPr>
         <p:blipFill rotWithShape="1">
           <a:blip r:embed="rId2"/>
-          <a:srcRect l="1340" t="1449" r="1195"/>
+          <a:srcRect l="1284" t="1674" r="1280"/>
           <a:stretch/>
         </p:blipFill>
         <p:spPr>
           <a:xfrm>
-            <a:off x="2173514" y="592880"/>
-            <a:ext cx="4796971" cy="3759589"/>
+            <a:off x="3846286" y="312057"/>
+            <a:ext cx="5087257" cy="4047986"/>
           </a:xfrm>
           <a:prstGeom prst="rect">
             <a:avLst/>
@@ -5346,49 +5009,110 @@
       </p:pic>
       <p:sp>
         <p:nvSpPr>
-          <p:cNvPr id="5" name="TextBox 4">
+          <p:cNvPr id="7" name="Rectangle 6">
             <a:extLst>
               <a:ext uri="{FF2B5EF4-FFF2-40B4-BE49-F238E27FC236}">
-                <a16:creationId xmlns:a16="http://schemas.microsoft.com/office/drawing/2014/main" id="{47542758-3259-4965-A3FD-A65844097FCA}"/>
+                <a16:creationId xmlns:a16="http://schemas.microsoft.com/office/drawing/2014/main" id="{E236CE6A-D2D9-4F39-AB8C-464AF551CFC3}"/>
               </a:ext>
             </a:extLst>
           </p:cNvPr>
-          <p:cNvSpPr txBox="1"/>
+          <p:cNvSpPr/>
           <p:nvPr/>
         </p:nvSpPr>
         <p:spPr>
           <a:xfrm>
-            <a:off x="805541" y="61111"/>
-            <a:ext cx="7532915" cy="584775"/>
+            <a:off x="5130799" y="2002971"/>
+            <a:ext cx="3701144" cy="783158"/>
           </a:xfrm>
           <a:prstGeom prst="rect">
             <a:avLst/>
           </a:prstGeom>
           <a:noFill/>
-        </p:spPr>
+          <a:ln w="19050">
+            <a:solidFill>
+              <a:srgbClr val="FF0000"/>
+            </a:solidFill>
+          </a:ln>
+          <a:effectLst/>
+        </p:spPr>
+        <p:style>
+          <a:lnRef idx="1">
+            <a:schemeClr val="accent1"/>
+          </a:lnRef>
+          <a:fillRef idx="3">
+            <a:schemeClr val="accent1"/>
+          </a:fillRef>
+          <a:effectRef idx="2">
+            <a:schemeClr val="accent1"/>
+          </a:effectRef>
+          <a:fontRef idx="minor">
+            <a:schemeClr val="lt1"/>
+          </a:fontRef>
+        </p:style>
         <p:txBody>
-          <a:bodyPr wrap="square" rtlCol="0">
-            <a:spAutoFit/>
-          </a:bodyPr>
+          <a:bodyPr rtlCol="0" anchor="ctr"/>
           <a:lstStyle/>
           <a:p>
-            <a:r>
-              <a:rPr lang="en-US" sz="3200" dirty="0">
-                <a:solidFill>
-                  <a:schemeClr val="bg2">
-                    <a:lumMod val="10000"/>
-                  </a:schemeClr>
-                </a:solidFill>
-              </a:rPr>
-              <a:t>This File Explorer tab will pop up</a:t>
-            </a:r>
+            <a:pPr algn="ctr"/>
+            <a:endParaRPr lang="en-US"/>
+          </a:p>
+        </p:txBody>
+      </p:sp>
+      <p:sp>
+        <p:nvSpPr>
+          <p:cNvPr id="8" name="Rectangle 7">
+            <a:extLst>
+              <a:ext uri="{FF2B5EF4-FFF2-40B4-BE49-F238E27FC236}">
+                <a16:creationId xmlns:a16="http://schemas.microsoft.com/office/drawing/2014/main" id="{2A3A1044-B29D-4A61-8162-6CB00FE38541}"/>
+              </a:ext>
+            </a:extLst>
+          </p:cNvPr>
+          <p:cNvSpPr/>
+          <p:nvPr/>
+        </p:nvSpPr>
+        <p:spPr>
+          <a:xfrm>
+            <a:off x="7075713" y="3823625"/>
+            <a:ext cx="885373" cy="410323"/>
+          </a:xfrm>
+          <a:prstGeom prst="rect">
+            <a:avLst/>
+          </a:prstGeom>
+          <a:noFill/>
+          <a:ln w="19050">
+            <a:solidFill>
+              <a:srgbClr val="FF0000"/>
+            </a:solidFill>
+          </a:ln>
+          <a:effectLst/>
+        </p:spPr>
+        <p:style>
+          <a:lnRef idx="1">
+            <a:schemeClr val="accent1"/>
+          </a:lnRef>
+          <a:fillRef idx="3">
+            <a:schemeClr val="accent1"/>
+          </a:fillRef>
+          <a:effectRef idx="2">
+            <a:schemeClr val="accent1"/>
+          </a:effectRef>
+          <a:fontRef idx="minor">
+            <a:schemeClr val="lt1"/>
+          </a:fontRef>
+        </p:style>
+        <p:txBody>
+          <a:bodyPr rtlCol="0" anchor="ctr"/>
+          <a:lstStyle/>
+          <a:p>
+            <a:pPr algn="ctr"/>
+            <a:endParaRPr lang="en-US"/>
           </a:p>
         </p:txBody>
       </p:sp>
     </p:spTree>
     <p:extLst>
       <p:ext uri="{BB962C8B-B14F-4D97-AF65-F5344CB8AC3E}">
-        <p14:creationId xmlns:p14="http://schemas.microsoft.com/office/powerpoint/2010/main" val="1723893334"/>
+        <p14:creationId xmlns:p14="http://schemas.microsoft.com/office/powerpoint/2010/main" val="2270499284"/>
       </p:ext>
     </p:extLst>
   </p:cSld>
@@ -5468,12 +5192,41 @@
           </a:p>
         </p:txBody>
       </p:sp>
+      <p:pic>
+        <p:nvPicPr>
+          <p:cNvPr id="7" name="Picture 6">
+            <a:extLst>
+              <a:ext uri="{FF2B5EF4-FFF2-40B4-BE49-F238E27FC236}">
+                <a16:creationId xmlns:a16="http://schemas.microsoft.com/office/drawing/2014/main" id="{783C77C6-383D-4986-8C66-C5089E772B1E}"/>
+              </a:ext>
+            </a:extLst>
+          </p:cNvPr>
+          <p:cNvPicPr>
+            <a:picLocks noChangeAspect="1"/>
+          </p:cNvPicPr>
+          <p:nvPr/>
+        </p:nvPicPr>
+        <p:blipFill rotWithShape="1">
+          <a:blip r:embed="rId2"/>
+          <a:srcRect l="2415" t="3104" r="15005" b="4803"/>
+          <a:stretch/>
+        </p:blipFill>
+        <p:spPr>
+          <a:xfrm>
+            <a:off x="3846286" y="119587"/>
+            <a:ext cx="5188857" cy="4109206"/>
+          </a:xfrm>
+          <a:prstGeom prst="rect">
+            <a:avLst/>
+          </a:prstGeom>
+        </p:spPr>
+      </p:pic>
       <p:sp>
         <p:nvSpPr>
-          <p:cNvPr id="5" name="TextBox 4">
+          <p:cNvPr id="8" name="TextBox 7">
             <a:extLst>
               <a:ext uri="{FF2B5EF4-FFF2-40B4-BE49-F238E27FC236}">
-                <a16:creationId xmlns:a16="http://schemas.microsoft.com/office/drawing/2014/main" id="{47542758-3259-4965-A3FD-A65844097FCA}"/>
+                <a16:creationId xmlns:a16="http://schemas.microsoft.com/office/drawing/2014/main" id="{5975849E-61AE-4F61-87E2-EBF3BC65BCBA}"/>
               </a:ext>
             </a:extLst>
           </p:cNvPr>
@@ -5482,8 +5235,8 @@
         </p:nvSpPr>
         <p:spPr>
           <a:xfrm>
-            <a:off x="210603" y="312057"/>
-            <a:ext cx="3635683" cy="3785652"/>
+            <a:off x="-65169" y="660400"/>
+            <a:ext cx="3635683" cy="2862322"/>
           </a:xfrm>
           <a:prstGeom prst="rect">
             <a:avLst/>
@@ -5508,10 +5261,53 @@
                   </a:schemeClr>
                 </a:solidFill>
               </a:rPr>
-              <a:t>Navigate to the files you would like to select</a:t>
+              <a:t>Once files are selected, they will populate here</a:t>
             </a:r>
           </a:p>
           <a:p>
+            <a:pPr marL="457200" indent="-457200">
+              <a:buFont typeface="Arial" panose="020B0604020202020204" pitchFamily="34" charset="0"/>
+              <a:buChar char="•"/>
+            </a:pPr>
+            <a:endParaRPr lang="en-US" sz="2000" dirty="0">
+              <a:solidFill>
+                <a:schemeClr val="bg2">
+                  <a:lumMod val="10000"/>
+                </a:schemeClr>
+              </a:solidFill>
+            </a:endParaRPr>
+          </a:p>
+          <a:p>
+            <a:pPr marL="457200" indent="-457200">
+              <a:buFont typeface="Arial" panose="020B0604020202020204" pitchFamily="34" charset="0"/>
+              <a:buChar char="•"/>
+            </a:pPr>
+            <a:endParaRPr lang="en-US" sz="2000" dirty="0">
+              <a:solidFill>
+                <a:schemeClr val="bg2">
+                  <a:lumMod val="10000"/>
+                </a:schemeClr>
+              </a:solidFill>
+            </a:endParaRPr>
+          </a:p>
+          <a:p>
+            <a:pPr marL="457200" indent="-457200">
+              <a:buFont typeface="Arial" panose="020B0604020202020204" pitchFamily="34" charset="0"/>
+              <a:buChar char="•"/>
+            </a:pPr>
+            <a:endParaRPr lang="en-US" sz="2000" dirty="0">
+              <a:solidFill>
+                <a:schemeClr val="bg2">
+                  <a:lumMod val="10000"/>
+                </a:schemeClr>
+              </a:solidFill>
+            </a:endParaRPr>
+          </a:p>
+          <a:p>
+            <a:pPr marL="457200" indent="-457200">
+              <a:buFont typeface="Arial" panose="020B0604020202020204" pitchFamily="34" charset="0"/>
+              <a:buChar char="•"/>
+            </a:pPr>
             <a:endParaRPr lang="en-US" sz="2000" dirty="0">
               <a:solidFill>
                 <a:schemeClr val="bg2">
@@ -5533,71 +5329,111 @@
                   </a:schemeClr>
                 </a:solidFill>
               </a:rPr>
-              <a:t>Select the files by holding down the control button and clicking them. They will automatically be highlighted in blue when selected</a:t>
-            </a:r>
-          </a:p>
-          <a:p>
-            <a:endParaRPr lang="en-US" sz="2000" dirty="0">
-              <a:solidFill>
-                <a:schemeClr val="bg2">
-                  <a:lumMod val="10000"/>
-                </a:schemeClr>
-              </a:solidFill>
-            </a:endParaRPr>
-          </a:p>
-          <a:p>
-            <a:pPr marL="457200" indent="-457200">
-              <a:buFont typeface="Arial" panose="020B0604020202020204" pitchFamily="34" charset="0"/>
-              <a:buChar char="•"/>
-            </a:pPr>
-            <a:r>
-              <a:rPr lang="en-US" sz="2000" dirty="0">
-                <a:solidFill>
-                  <a:schemeClr val="bg2">
-                    <a:lumMod val="10000"/>
-                  </a:schemeClr>
-                </a:solidFill>
-              </a:rPr>
-              <a:t>Press “Open” button when done</a:t>
+              <a:t>The list of channels for those files will populate here </a:t>
             </a:r>
           </a:p>
         </p:txBody>
       </p:sp>
-      <p:pic>
-        <p:nvPicPr>
-          <p:cNvPr id="3" name="Picture 2">
+      <p:cxnSp>
+        <p:nvCxnSpPr>
+          <p:cNvPr id="9" name="Straight Arrow Connector 8">
             <a:extLst>
               <a:ext uri="{FF2B5EF4-FFF2-40B4-BE49-F238E27FC236}">
-                <a16:creationId xmlns:a16="http://schemas.microsoft.com/office/drawing/2014/main" id="{14209CE8-14E9-448B-BCC8-179D4FBE664E}"/>
+                <a16:creationId xmlns:a16="http://schemas.microsoft.com/office/drawing/2014/main" id="{6CA6E4F9-6683-4568-89AD-5DB8690B25EE}"/>
               </a:ext>
             </a:extLst>
           </p:cNvPr>
-          <p:cNvPicPr>
-            <a:picLocks noChangeAspect="1"/>
-          </p:cNvPicPr>
+          <p:cNvCxnSpPr>
+            <a:cxnSpLocks/>
+          </p:cNvCxnSpPr>
           <p:nvPr/>
-        </p:nvPicPr>
-        <p:blipFill rotWithShape="1">
-          <a:blip r:embed="rId2"/>
-          <a:srcRect l="1284" t="1674" r="1280"/>
-          <a:stretch/>
-        </p:blipFill>
-        <p:spPr>
-          <a:xfrm>
-            <a:off x="3846286" y="312057"/>
-            <a:ext cx="5087257" cy="4047986"/>
-          </a:xfrm>
-          <a:prstGeom prst="rect">
-            <a:avLst/>
-          </a:prstGeom>
-        </p:spPr>
-      </p:pic>
+        </p:nvCxnSpPr>
+        <p:spPr>
+          <a:xfrm>
+            <a:off x="3098800" y="1204686"/>
+            <a:ext cx="682171" cy="123371"/>
+          </a:xfrm>
+          <a:prstGeom prst="straightConnector1">
+            <a:avLst/>
+          </a:prstGeom>
+          <a:ln>
+            <a:solidFill>
+              <a:schemeClr val="bg2">
+                <a:lumMod val="10000"/>
+              </a:schemeClr>
+            </a:solidFill>
+            <a:tailEnd type="triangle"/>
+          </a:ln>
+          <a:effectLst/>
+        </p:spPr>
+        <p:style>
+          <a:lnRef idx="2">
+            <a:schemeClr val="accent1"/>
+          </a:lnRef>
+          <a:fillRef idx="0">
+            <a:schemeClr val="accent1"/>
+          </a:fillRef>
+          <a:effectRef idx="1">
+            <a:schemeClr val="accent1"/>
+          </a:effectRef>
+          <a:fontRef idx="minor">
+            <a:schemeClr val="tx1"/>
+          </a:fontRef>
+        </p:style>
+      </p:cxnSp>
+      <p:cxnSp>
+        <p:nvCxnSpPr>
+          <p:cNvPr id="12" name="Straight Arrow Connector 11">
+            <a:extLst>
+              <a:ext uri="{FF2B5EF4-FFF2-40B4-BE49-F238E27FC236}">
+                <a16:creationId xmlns:a16="http://schemas.microsoft.com/office/drawing/2014/main" id="{FD999985-1B25-4DE9-BA75-5C02AC0EBE11}"/>
+              </a:ext>
+            </a:extLst>
+          </p:cNvPr>
+          <p:cNvCxnSpPr>
+            <a:cxnSpLocks/>
+          </p:cNvCxnSpPr>
+          <p:nvPr/>
+        </p:nvCxnSpPr>
+        <p:spPr>
+          <a:xfrm flipV="1">
+            <a:off x="3113314" y="2783960"/>
+            <a:ext cx="1770743" cy="175517"/>
+          </a:xfrm>
+          <a:prstGeom prst="straightConnector1">
+            <a:avLst/>
+          </a:prstGeom>
+          <a:ln>
+            <a:solidFill>
+              <a:schemeClr val="bg2">
+                <a:lumMod val="10000"/>
+              </a:schemeClr>
+            </a:solidFill>
+            <a:tailEnd type="triangle"/>
+          </a:ln>
+          <a:effectLst/>
+        </p:spPr>
+        <p:style>
+          <a:lnRef idx="2">
+            <a:schemeClr val="accent1"/>
+          </a:lnRef>
+          <a:fillRef idx="0">
+            <a:schemeClr val="accent1"/>
+          </a:fillRef>
+          <a:effectRef idx="1">
+            <a:schemeClr val="accent1"/>
+          </a:effectRef>
+          <a:fontRef idx="minor">
+            <a:schemeClr val="tx1"/>
+          </a:fontRef>
+        </p:style>
+      </p:cxnSp>
       <p:sp>
         <p:nvSpPr>
-          <p:cNvPr id="7" name="Rectangle 6">
+          <p:cNvPr id="14" name="Rectangle 13">
             <a:extLst>
               <a:ext uri="{FF2B5EF4-FFF2-40B4-BE49-F238E27FC236}">
-                <a16:creationId xmlns:a16="http://schemas.microsoft.com/office/drawing/2014/main" id="{E236CE6A-D2D9-4F39-AB8C-464AF551CFC3}"/>
+                <a16:creationId xmlns:a16="http://schemas.microsoft.com/office/drawing/2014/main" id="{628C0747-CEBD-47A7-9604-7375FF6916BA}"/>
               </a:ext>
             </a:extLst>
           </p:cNvPr>
@@ -5606,8 +5442,8 @@
         </p:nvSpPr>
         <p:spPr>
           <a:xfrm>
-            <a:off x="5130799" y="2002971"/>
-            <a:ext cx="3701144" cy="783158"/>
+            <a:off x="3780971" y="947975"/>
+            <a:ext cx="5304972" cy="1069511"/>
           </a:xfrm>
           <a:prstGeom prst="rect">
             <a:avLst/>
@@ -5645,10 +5481,10 @@
       </p:sp>
       <p:sp>
         <p:nvSpPr>
-          <p:cNvPr id="8" name="Rectangle 7">
+          <p:cNvPr id="15" name="Rectangle 14">
             <a:extLst>
               <a:ext uri="{FF2B5EF4-FFF2-40B4-BE49-F238E27FC236}">
-                <a16:creationId xmlns:a16="http://schemas.microsoft.com/office/drawing/2014/main" id="{2A3A1044-B29D-4A61-8162-6CB00FE38541}"/>
+                <a16:creationId xmlns:a16="http://schemas.microsoft.com/office/drawing/2014/main" id="{F7580490-ECE5-4A3C-91AD-B8B3ED912C81}"/>
               </a:ext>
             </a:extLst>
           </p:cNvPr>
@@ -5657,8 +5493,8 @@
         </p:nvSpPr>
         <p:spPr>
           <a:xfrm>
-            <a:off x="7075713" y="3823625"/>
-            <a:ext cx="885373" cy="410323"/>
+            <a:off x="4884057" y="2267532"/>
+            <a:ext cx="1625600" cy="1709382"/>
           </a:xfrm>
           <a:prstGeom prst="rect">
             <a:avLst/>
@@ -5697,7 +5533,7 @@
     </p:spTree>
     <p:extLst>
       <p:ext uri="{BB962C8B-B14F-4D97-AF65-F5344CB8AC3E}">
-        <p14:creationId xmlns:p14="http://schemas.microsoft.com/office/powerpoint/2010/main" val="2270499284"/>
+        <p14:creationId xmlns:p14="http://schemas.microsoft.com/office/powerpoint/2010/main" val="4183984855"/>
       </p:ext>
     </p:extLst>
   </p:cSld>
@@ -5779,10 +5615,10 @@
       </p:sp>
       <p:pic>
         <p:nvPicPr>
-          <p:cNvPr id="7" name="Picture 6">
+          <p:cNvPr id="5" name="Picture 4">
             <a:extLst>
               <a:ext uri="{FF2B5EF4-FFF2-40B4-BE49-F238E27FC236}">
-                <a16:creationId xmlns:a16="http://schemas.microsoft.com/office/drawing/2014/main" id="{783C77C6-383D-4986-8C66-C5089E772B1E}"/>
+                <a16:creationId xmlns:a16="http://schemas.microsoft.com/office/drawing/2014/main" id="{E0812D0C-4812-4912-9118-A54A79C183C1}"/>
               </a:ext>
             </a:extLst>
           </p:cNvPr>
@@ -5808,10 +5644,10 @@
       </p:pic>
       <p:sp>
         <p:nvSpPr>
-          <p:cNvPr id="8" name="TextBox 7">
+          <p:cNvPr id="6" name="TextBox 5">
             <a:extLst>
               <a:ext uri="{FF2B5EF4-FFF2-40B4-BE49-F238E27FC236}">
-                <a16:creationId xmlns:a16="http://schemas.microsoft.com/office/drawing/2014/main" id="{5975849E-61AE-4F61-87E2-EBF3BC65BCBA}"/>
+                <a16:creationId xmlns:a16="http://schemas.microsoft.com/office/drawing/2014/main" id="{467D8C90-DC23-4B54-9100-608BC4051EB3}"/>
               </a:ext>
             </a:extLst>
           </p:cNvPr>
@@ -5820,7 +5656,7 @@
         </p:nvSpPr>
         <p:spPr>
           <a:xfrm>
-            <a:off x="-65169" y="660400"/>
+            <a:off x="210603" y="312057"/>
             <a:ext cx="3635683" cy="2862322"/>
           </a:xfrm>
           <a:prstGeom prst="rect">
@@ -5846,47 +5682,8 @@
                   </a:schemeClr>
                 </a:solidFill>
               </a:rPr>
-              <a:t>Once files are selected, they will populate here</a:t>
+              <a:t>To select the desired channels to plot, first highlight and delete “Type channel here” in the search box</a:t>
             </a:r>
-          </a:p>
-          <a:p>
-            <a:pPr marL="457200" indent="-457200">
-              <a:buFont typeface="Arial" panose="020B0604020202020204" pitchFamily="34" charset="0"/>
-              <a:buChar char="•"/>
-            </a:pPr>
-            <a:endParaRPr lang="en-US" sz="2000" dirty="0">
-              <a:solidFill>
-                <a:schemeClr val="bg2">
-                  <a:lumMod val="10000"/>
-                </a:schemeClr>
-              </a:solidFill>
-            </a:endParaRPr>
-          </a:p>
-          <a:p>
-            <a:pPr marL="457200" indent="-457200">
-              <a:buFont typeface="Arial" panose="020B0604020202020204" pitchFamily="34" charset="0"/>
-              <a:buChar char="•"/>
-            </a:pPr>
-            <a:endParaRPr lang="en-US" sz="2000" dirty="0">
-              <a:solidFill>
-                <a:schemeClr val="bg2">
-                  <a:lumMod val="10000"/>
-                </a:schemeClr>
-              </a:solidFill>
-            </a:endParaRPr>
-          </a:p>
-          <a:p>
-            <a:pPr marL="457200" indent="-457200">
-              <a:buFont typeface="Arial" panose="020B0604020202020204" pitchFamily="34" charset="0"/>
-              <a:buChar char="•"/>
-            </a:pPr>
-            <a:endParaRPr lang="en-US" sz="2000" dirty="0">
-              <a:solidFill>
-                <a:schemeClr val="bg2">
-                  <a:lumMod val="10000"/>
-                </a:schemeClr>
-              </a:solidFill>
-            </a:endParaRPr>
           </a:p>
           <a:p>
             <a:pPr marL="457200" indent="-457200">
@@ -5914,17 +5711,17 @@
                   </a:schemeClr>
                 </a:solidFill>
               </a:rPr>
-              <a:t>The list of channels for those files will populate here </a:t>
+              <a:t>Then, begin typing the name of the channel in the search box</a:t>
             </a:r>
           </a:p>
         </p:txBody>
       </p:sp>
       <p:cxnSp>
         <p:nvCxnSpPr>
-          <p:cNvPr id="9" name="Straight Arrow Connector 8">
+          <p:cNvPr id="7" name="Straight Arrow Connector 6">
             <a:extLst>
               <a:ext uri="{FF2B5EF4-FFF2-40B4-BE49-F238E27FC236}">
-                <a16:creationId xmlns:a16="http://schemas.microsoft.com/office/drawing/2014/main" id="{6CA6E4F9-6683-4568-89AD-5DB8690B25EE}"/>
+                <a16:creationId xmlns:a16="http://schemas.microsoft.com/office/drawing/2014/main" id="{022CCF34-2E33-44FC-94F2-D68459444CA5}"/>
               </a:ext>
             </a:extLst>
           </p:cNvPr>
@@ -5935,8 +5732,8 @@
         </p:nvCxnSpPr>
         <p:spPr>
           <a:xfrm>
-            <a:off x="3098800" y="1204686"/>
-            <a:ext cx="682171" cy="123371"/>
+            <a:off x="2605315" y="1683658"/>
+            <a:ext cx="2532742" cy="558799"/>
           </a:xfrm>
           <a:prstGeom prst="straightConnector1">
             <a:avLst/>
@@ -5966,59 +5763,12 @@
           </a:fontRef>
         </p:style>
       </p:cxnSp>
-      <p:cxnSp>
-        <p:nvCxnSpPr>
-          <p:cNvPr id="12" name="Straight Arrow Connector 11">
-            <a:extLst>
-              <a:ext uri="{FF2B5EF4-FFF2-40B4-BE49-F238E27FC236}">
-                <a16:creationId xmlns:a16="http://schemas.microsoft.com/office/drawing/2014/main" id="{FD999985-1B25-4DE9-BA75-5C02AC0EBE11}"/>
-              </a:ext>
-            </a:extLst>
-          </p:cNvPr>
-          <p:cNvCxnSpPr>
-            <a:cxnSpLocks/>
-          </p:cNvCxnSpPr>
-          <p:nvPr/>
-        </p:nvCxnSpPr>
-        <p:spPr>
-          <a:xfrm flipV="1">
-            <a:off x="3113314" y="2783960"/>
-            <a:ext cx="1770743" cy="175517"/>
-          </a:xfrm>
-          <a:prstGeom prst="straightConnector1">
-            <a:avLst/>
-          </a:prstGeom>
-          <a:ln>
-            <a:solidFill>
-              <a:schemeClr val="bg2">
-                <a:lumMod val="10000"/>
-              </a:schemeClr>
-            </a:solidFill>
-            <a:tailEnd type="triangle"/>
-          </a:ln>
-          <a:effectLst/>
-        </p:spPr>
-        <p:style>
-          <a:lnRef idx="2">
-            <a:schemeClr val="accent1"/>
-          </a:lnRef>
-          <a:fillRef idx="0">
-            <a:schemeClr val="accent1"/>
-          </a:fillRef>
-          <a:effectRef idx="1">
-            <a:schemeClr val="accent1"/>
-          </a:effectRef>
-          <a:fontRef idx="minor">
-            <a:schemeClr val="tx1"/>
-          </a:fontRef>
-        </p:style>
-      </p:cxnSp>
       <p:sp>
         <p:nvSpPr>
-          <p:cNvPr id="14" name="Rectangle 13">
+          <p:cNvPr id="8" name="Rectangle 7">
             <a:extLst>
               <a:ext uri="{FF2B5EF4-FFF2-40B4-BE49-F238E27FC236}">
-                <a16:creationId xmlns:a16="http://schemas.microsoft.com/office/drawing/2014/main" id="{628C0747-CEBD-47A7-9604-7375FF6916BA}"/>
+                <a16:creationId xmlns:a16="http://schemas.microsoft.com/office/drawing/2014/main" id="{CC4B5CCD-5E2D-4B28-ADEE-2DBDF2406F47}"/>
               </a:ext>
             </a:extLst>
           </p:cNvPr>
@@ -6027,8 +5777,8 @@
         </p:nvSpPr>
         <p:spPr>
           <a:xfrm>
-            <a:off x="3780971" y="947975"/>
-            <a:ext cx="5304972" cy="1069511"/>
+            <a:off x="5177971" y="2037295"/>
+            <a:ext cx="1063027" cy="410323"/>
           </a:xfrm>
           <a:prstGeom prst="rect">
             <a:avLst/>
@@ -6064,61 +5814,10 @@
           </a:p>
         </p:txBody>
       </p:sp>
-      <p:sp>
-        <p:nvSpPr>
-          <p:cNvPr id="15" name="Rectangle 14">
-            <a:extLst>
-              <a:ext uri="{FF2B5EF4-FFF2-40B4-BE49-F238E27FC236}">
-                <a16:creationId xmlns:a16="http://schemas.microsoft.com/office/drawing/2014/main" id="{F7580490-ECE5-4A3C-91AD-B8B3ED912C81}"/>
-              </a:ext>
-            </a:extLst>
-          </p:cNvPr>
-          <p:cNvSpPr/>
-          <p:nvPr/>
-        </p:nvSpPr>
-        <p:spPr>
-          <a:xfrm>
-            <a:off x="4884057" y="2267532"/>
-            <a:ext cx="1625600" cy="1709382"/>
-          </a:xfrm>
-          <a:prstGeom prst="rect">
-            <a:avLst/>
-          </a:prstGeom>
-          <a:noFill/>
-          <a:ln w="19050">
-            <a:solidFill>
-              <a:srgbClr val="FF0000"/>
-            </a:solidFill>
-          </a:ln>
-          <a:effectLst/>
-        </p:spPr>
-        <p:style>
-          <a:lnRef idx="1">
-            <a:schemeClr val="accent1"/>
-          </a:lnRef>
-          <a:fillRef idx="3">
-            <a:schemeClr val="accent1"/>
-          </a:fillRef>
-          <a:effectRef idx="2">
-            <a:schemeClr val="accent1"/>
-          </a:effectRef>
-          <a:fontRef idx="minor">
-            <a:schemeClr val="lt1"/>
-          </a:fontRef>
-        </p:style>
-        <p:txBody>
-          <a:bodyPr rtlCol="0" anchor="ctr"/>
-          <a:lstStyle/>
-          <a:p>
-            <a:pPr algn="ctr"/>
-            <a:endParaRPr lang="en-US"/>
-          </a:p>
-        </p:txBody>
-      </p:sp>
     </p:spTree>
     <p:extLst>
       <p:ext uri="{BB962C8B-B14F-4D97-AF65-F5344CB8AC3E}">
-        <p14:creationId xmlns:p14="http://schemas.microsoft.com/office/powerpoint/2010/main" val="4183984855"/>
+        <p14:creationId xmlns:p14="http://schemas.microsoft.com/office/powerpoint/2010/main" val="2703127992"/>
       </p:ext>
     </p:extLst>
   </p:cSld>
@@ -6200,10 +5899,10 @@
       </p:sp>
       <p:pic>
         <p:nvPicPr>
-          <p:cNvPr id="5" name="Picture 4">
+          <p:cNvPr id="2" name="Picture 1">
             <a:extLst>
               <a:ext uri="{FF2B5EF4-FFF2-40B4-BE49-F238E27FC236}">
-                <a16:creationId xmlns:a16="http://schemas.microsoft.com/office/drawing/2014/main" id="{E0812D0C-4812-4912-9118-A54A79C183C1}"/>
+                <a16:creationId xmlns:a16="http://schemas.microsoft.com/office/drawing/2014/main" id="{047C53D1-816E-44D1-9CD0-FC99F3742548}"/>
               </a:ext>
             </a:extLst>
           </p:cNvPr>
@@ -6214,13 +5913,13 @@
         </p:nvPicPr>
         <p:blipFill rotWithShape="1">
           <a:blip r:embed="rId2"/>
-          <a:srcRect l="2415" t="3104" r="15005" b="4803"/>
+          <a:srcRect l="2561" t="4514" r="3474" b="5609"/>
           <a:stretch/>
         </p:blipFill>
         <p:spPr>
           <a:xfrm>
-            <a:off x="3846286" y="119587"/>
-            <a:ext cx="5188857" cy="4109206"/>
+            <a:off x="3846285" y="333828"/>
+            <a:ext cx="5142797" cy="3868058"/>
           </a:xfrm>
           <a:prstGeom prst="rect">
             <a:avLst/>
@@ -6229,10 +5928,10 @@
       </p:pic>
       <p:sp>
         <p:nvSpPr>
-          <p:cNvPr id="6" name="TextBox 5">
+          <p:cNvPr id="5" name="TextBox 4">
             <a:extLst>
               <a:ext uri="{FF2B5EF4-FFF2-40B4-BE49-F238E27FC236}">
-                <a16:creationId xmlns:a16="http://schemas.microsoft.com/office/drawing/2014/main" id="{467D8C90-DC23-4B54-9100-608BC4051EB3}"/>
+                <a16:creationId xmlns:a16="http://schemas.microsoft.com/office/drawing/2014/main" id="{EFD97C2D-C2D6-4FDB-86A6-53DE98A8F1C9}"/>
               </a:ext>
             </a:extLst>
           </p:cNvPr>
@@ -6242,7 +5941,7 @@
         <p:spPr>
           <a:xfrm>
             <a:off x="210603" y="312057"/>
-            <a:ext cx="3635683" cy="2862322"/>
+            <a:ext cx="3635683" cy="3170099"/>
           </a:xfrm>
           <a:prstGeom prst="rect">
             <a:avLst/>
@@ -6267,7 +5966,7 @@
                   </a:schemeClr>
                 </a:solidFill>
               </a:rPr>
-              <a:t>To select the desired channels to plot, first highlight and delete “Type channel here” in the search box</a:t>
+              <a:t>The list of channels will be filtered according to what has been typed</a:t>
             </a:r>
           </a:p>
           <a:p>
@@ -6296,17 +5995,17 @@
                   </a:schemeClr>
                 </a:solidFill>
               </a:rPr>
-              <a:t>Then, begin typing the name of the channel in the search box</a:t>
+              <a:t>For example, “riso” has been typed in and the channels are automatically filtered to the channels that include “riso”</a:t>
             </a:r>
           </a:p>
         </p:txBody>
       </p:sp>
       <p:cxnSp>
         <p:nvCxnSpPr>
-          <p:cNvPr id="7" name="Straight Arrow Connector 6">
+          <p:cNvPr id="6" name="Straight Arrow Connector 5">
             <a:extLst>
               <a:ext uri="{FF2B5EF4-FFF2-40B4-BE49-F238E27FC236}">
-                <a16:creationId xmlns:a16="http://schemas.microsoft.com/office/drawing/2014/main" id="{022CCF34-2E33-44FC-94F2-D68459444CA5}"/>
+                <a16:creationId xmlns:a16="http://schemas.microsoft.com/office/drawing/2014/main" id="{1BCB1112-A749-42E2-8214-4BC608FB3EB9}"/>
               </a:ext>
             </a:extLst>
           </p:cNvPr>
@@ -6317,8 +6016,8 @@
         </p:nvCxnSpPr>
         <p:spPr>
           <a:xfrm>
-            <a:off x="2605315" y="1683658"/>
-            <a:ext cx="2532742" cy="558799"/>
+            <a:off x="2293258" y="2188754"/>
+            <a:ext cx="2561771" cy="404767"/>
           </a:xfrm>
           <a:prstGeom prst="straightConnector1">
             <a:avLst/>
@@ -6350,10 +6049,10 @@
       </p:cxnSp>
       <p:sp>
         <p:nvSpPr>
-          <p:cNvPr id="8" name="Rectangle 7">
+          <p:cNvPr id="9" name="Rectangle 8">
             <a:extLst>
               <a:ext uri="{FF2B5EF4-FFF2-40B4-BE49-F238E27FC236}">
-                <a16:creationId xmlns:a16="http://schemas.microsoft.com/office/drawing/2014/main" id="{CC4B5CCD-5E2D-4B28-ADEE-2DBDF2406F47}"/>
+                <a16:creationId xmlns:a16="http://schemas.microsoft.com/office/drawing/2014/main" id="{A2DDDBE2-93B3-44E0-B66F-EEADE268A085}"/>
               </a:ext>
             </a:extLst>
           </p:cNvPr>
@@ -6362,8 +6061,8 @@
         </p:nvSpPr>
         <p:spPr>
           <a:xfrm>
-            <a:off x="5177971" y="2037295"/>
-            <a:ext cx="1063027" cy="410323"/>
+            <a:off x="4913087" y="2213439"/>
+            <a:ext cx="1553027" cy="1690904"/>
           </a:xfrm>
           <a:prstGeom prst="rect">
             <a:avLst/>
@@ -6402,7 +6101,7 @@
     </p:spTree>
     <p:extLst>
       <p:ext uri="{BB962C8B-B14F-4D97-AF65-F5344CB8AC3E}">
-        <p14:creationId xmlns:p14="http://schemas.microsoft.com/office/powerpoint/2010/main" val="2703127992"/>
+        <p14:creationId xmlns:p14="http://schemas.microsoft.com/office/powerpoint/2010/main" val="3461942798"/>
       </p:ext>
     </p:extLst>
   </p:cSld>
@@ -7376,9 +7075,12 @@
 </file>
 
 <file path=customXml/item1.xml><?xml version="1.0" encoding="utf-8"?>
-<p:properties xmlns:p="http://schemas.microsoft.com/office/2006/metadata/properties" xmlns:xsi="http://www.w3.org/2001/XMLSchema-instance" xmlns:pc="http://schemas.microsoft.com/office/infopath/2007/PartnerControls">
-  <documentManagement/>
-</p:properties>
+<?mso-contentType ?>
+<FormTemplates xmlns="http://schemas.microsoft.com/sharepoint/v3/contenttype/forms">
+  <Display>DocumentLibraryForm</Display>
+  <Edit>DocumentLibraryForm</Edit>
+  <New>DocumentLibraryForm</New>
+</FormTemplates>
 </file>
 
 <file path=customXml/item2.xml><?xml version="1.0" encoding="utf-8"?>
@@ -7566,26 +7268,15 @@
 </file>
 
 <file path=customXml/item3.xml><?xml version="1.0" encoding="utf-8"?>
-<?mso-contentType ?>
-<FormTemplates xmlns="http://schemas.microsoft.com/sharepoint/v3/contenttype/forms">
-  <Display>DocumentLibraryForm</Display>
-  <Edit>DocumentLibraryForm</Edit>
-  <New>DocumentLibraryForm</New>
-</FormTemplates>
+<p:properties xmlns:p="http://schemas.microsoft.com/office/2006/metadata/properties" xmlns:xsi="http://www.w3.org/2001/XMLSchema-instance" xmlns:pc="http://schemas.microsoft.com/office/infopath/2007/PartnerControls">
+  <documentManagement/>
+</p:properties>
 </file>
 
 <file path=customXml/itemProps1.xml><?xml version="1.0" encoding="utf-8"?>
-<ds:datastoreItem xmlns:ds="http://schemas.openxmlformats.org/officeDocument/2006/customXml" ds:itemID="{66E1F1CF-9850-42C6-8493-4B5F07661C5E}">
+<ds:datastoreItem xmlns:ds="http://schemas.openxmlformats.org/officeDocument/2006/customXml" ds:itemID="{D7EE4783-5838-49D1-9FAD-B1273E530DEE}">
   <ds:schemaRefs>
-    <ds:schemaRef ds:uri="http://schemas.microsoft.com/office/2006/metadata/properties"/>
-    <ds:schemaRef ds:uri="3f2a7d86-ba10-4826-865c-a0da56f83a2e"/>
-    <ds:schemaRef ds:uri="http://schemas.microsoft.com/office/2006/documentManagement/types"/>
-    <ds:schemaRef ds:uri="http://purl.org/dc/terms/"/>
-    <ds:schemaRef ds:uri="http://schemas.openxmlformats.org/package/2006/metadata/core-properties"/>
-    <ds:schemaRef ds:uri="http://purl.org/dc/dcmitype/"/>
-    <ds:schemaRef ds:uri="http://schemas.microsoft.com/office/infopath/2007/PartnerControls"/>
-    <ds:schemaRef ds:uri="http://purl.org/dc/elements/1.1/"/>
-    <ds:schemaRef ds:uri="http://www.w3.org/XML/1998/namespace"/>
+    <ds:schemaRef ds:uri="http://schemas.microsoft.com/sharepoint/v3/contenttype/forms"/>
   </ds:schemaRefs>
 </ds:datastoreItem>
 </file>
@@ -7609,9 +7300,17 @@
 </file>
 
 <file path=customXml/itemProps3.xml><?xml version="1.0" encoding="utf-8"?>
-<ds:datastoreItem xmlns:ds="http://schemas.openxmlformats.org/officeDocument/2006/customXml" ds:itemID="{D7EE4783-5838-49D1-9FAD-B1273E530DEE}">
+<ds:datastoreItem xmlns:ds="http://schemas.openxmlformats.org/officeDocument/2006/customXml" ds:itemID="{66E1F1CF-9850-42C6-8493-4B5F07661C5E}">
   <ds:schemaRefs>
-    <ds:schemaRef ds:uri="http://schemas.microsoft.com/sharepoint/v3/contenttype/forms"/>
+    <ds:schemaRef ds:uri="http://schemas.microsoft.com/office/2006/metadata/properties"/>
+    <ds:schemaRef ds:uri="3f2a7d86-ba10-4826-865c-a0da56f83a2e"/>
+    <ds:schemaRef ds:uri="http://schemas.microsoft.com/office/2006/documentManagement/types"/>
+    <ds:schemaRef ds:uri="http://purl.org/dc/terms/"/>
+    <ds:schemaRef ds:uri="http://schemas.openxmlformats.org/package/2006/metadata/core-properties"/>
+    <ds:schemaRef ds:uri="http://purl.org/dc/dcmitype/"/>
+    <ds:schemaRef ds:uri="http://schemas.microsoft.com/office/infopath/2007/PartnerControls"/>
+    <ds:schemaRef ds:uri="http://purl.org/dc/elements/1.1/"/>
+    <ds:schemaRef ds:uri="http://www.w3.org/XML/1998/namespace"/>
   </ds:schemaRefs>
 </ds:datastoreItem>
 </file>
</xml_diff>